<commit_message>
Half done assigning story points
</commit_message>
<xml_diff>
--- a/Assessment/Story Cards.pptx
+++ b/Assessment/Story Cards.pptx
@@ -220,7 +220,7 @@
           <a:p>
             <a:fld id="{BBDCA08C-34F0-41AE-AAA6-F23942C36312}" type="datetimeFigureOut">
               <a:rPr lang="en-AU" smtClean="0"/>
-              <a:t>17/08/2016</a:t>
+              <a:t>18/08/2016</a:t>
             </a:fld>
             <a:endParaRPr lang="en-AU"/>
           </a:p>
@@ -808,7 +808,7 @@
             <a:fld id="{1585DAA5-6BE2-467A-90B2-00E985D86198}" type="datetimeFigureOut">
               <a:rPr lang="en-AU" smtClean="0"/>
               <a:pPr/>
-              <a:t>17/08/2016</a:t>
+              <a:t>18/08/2016</a:t>
             </a:fld>
             <a:endParaRPr lang="en-AU"/>
           </a:p>
@@ -975,7 +975,7 @@
             <a:fld id="{1585DAA5-6BE2-467A-90B2-00E985D86198}" type="datetimeFigureOut">
               <a:rPr lang="en-AU" smtClean="0"/>
               <a:pPr/>
-              <a:t>17/08/2016</a:t>
+              <a:t>18/08/2016</a:t>
             </a:fld>
             <a:endParaRPr lang="en-AU"/>
           </a:p>
@@ -1152,7 +1152,7 @@
             <a:fld id="{1585DAA5-6BE2-467A-90B2-00E985D86198}" type="datetimeFigureOut">
               <a:rPr lang="en-AU" smtClean="0"/>
               <a:pPr/>
-              <a:t>17/08/2016</a:t>
+              <a:t>18/08/2016</a:t>
             </a:fld>
             <a:endParaRPr lang="en-AU"/>
           </a:p>
@@ -1319,7 +1319,7 @@
             <a:fld id="{1585DAA5-6BE2-467A-90B2-00E985D86198}" type="datetimeFigureOut">
               <a:rPr lang="en-AU" smtClean="0"/>
               <a:pPr/>
-              <a:t>17/08/2016</a:t>
+              <a:t>18/08/2016</a:t>
             </a:fld>
             <a:endParaRPr lang="en-AU"/>
           </a:p>
@@ -1562,7 +1562,7 @@
             <a:fld id="{1585DAA5-6BE2-467A-90B2-00E985D86198}" type="datetimeFigureOut">
               <a:rPr lang="en-AU" smtClean="0"/>
               <a:pPr/>
-              <a:t>17/08/2016</a:t>
+              <a:t>18/08/2016</a:t>
             </a:fld>
             <a:endParaRPr lang="en-AU"/>
           </a:p>
@@ -1847,7 +1847,7 @@
             <a:fld id="{1585DAA5-6BE2-467A-90B2-00E985D86198}" type="datetimeFigureOut">
               <a:rPr lang="en-AU" smtClean="0"/>
               <a:pPr/>
-              <a:t>17/08/2016</a:t>
+              <a:t>18/08/2016</a:t>
             </a:fld>
             <a:endParaRPr lang="en-AU"/>
           </a:p>
@@ -2266,7 +2266,7 @@
             <a:fld id="{1585DAA5-6BE2-467A-90B2-00E985D86198}" type="datetimeFigureOut">
               <a:rPr lang="en-AU" smtClean="0"/>
               <a:pPr/>
-              <a:t>17/08/2016</a:t>
+              <a:t>18/08/2016</a:t>
             </a:fld>
             <a:endParaRPr lang="en-AU"/>
           </a:p>
@@ -2381,7 +2381,7 @@
             <a:fld id="{1585DAA5-6BE2-467A-90B2-00E985D86198}" type="datetimeFigureOut">
               <a:rPr lang="en-AU" smtClean="0"/>
               <a:pPr/>
-              <a:t>17/08/2016</a:t>
+              <a:t>18/08/2016</a:t>
             </a:fld>
             <a:endParaRPr lang="en-AU"/>
           </a:p>
@@ -2473,7 +2473,7 @@
             <a:fld id="{1585DAA5-6BE2-467A-90B2-00E985D86198}" type="datetimeFigureOut">
               <a:rPr lang="en-AU" smtClean="0"/>
               <a:pPr/>
-              <a:t>17/08/2016</a:t>
+              <a:t>18/08/2016</a:t>
             </a:fld>
             <a:endParaRPr lang="en-AU"/>
           </a:p>
@@ -2747,7 +2747,7 @@
             <a:fld id="{1585DAA5-6BE2-467A-90B2-00E985D86198}" type="datetimeFigureOut">
               <a:rPr lang="en-AU" smtClean="0"/>
               <a:pPr/>
-              <a:t>17/08/2016</a:t>
+              <a:t>18/08/2016</a:t>
             </a:fld>
             <a:endParaRPr lang="en-AU"/>
           </a:p>
@@ -2997,7 +2997,7 @@
             <a:fld id="{1585DAA5-6BE2-467A-90B2-00E985D86198}" type="datetimeFigureOut">
               <a:rPr lang="en-AU" smtClean="0"/>
               <a:pPr/>
-              <a:t>17/08/2016</a:t>
+              <a:t>18/08/2016</a:t>
             </a:fld>
             <a:endParaRPr lang="en-AU"/>
           </a:p>
@@ -3207,7 +3207,7 @@
             <a:fld id="{1585DAA5-6BE2-467A-90B2-00E985D86198}" type="datetimeFigureOut">
               <a:rPr lang="en-AU" smtClean="0"/>
               <a:pPr/>
-              <a:t>17/08/2016</a:t>
+              <a:t>18/08/2016</a:t>
             </a:fld>
             <a:endParaRPr lang="en-AU"/>
           </a:p>
@@ -4025,7 +4025,18 @@
                   <a:schemeClr val="tx1"/>
                 </a:solidFill>
               </a:rPr>
-              <a:t>Story Points</a:t>
+              <a:t>SP</a:t>
+            </a:r>
+          </a:p>
+          <a:p>
+            <a:pPr algn="ctr"/>
+            <a:r>
+              <a:rPr lang="en-AU" sz="2000" dirty="0">
+                <a:solidFill>
+                  <a:schemeClr val="tx1"/>
+                </a:solidFill>
+              </a:rPr>
+              <a:t>4</a:t>
             </a:r>
           </a:p>
         </p:txBody>
@@ -4472,7 +4483,18 @@
                   <a:schemeClr val="tx1"/>
                 </a:solidFill>
               </a:rPr>
-              <a:t>Story Points</a:t>
+              <a:t>SP</a:t>
+            </a:r>
+          </a:p>
+          <a:p>
+            <a:pPr algn="ctr"/>
+            <a:r>
+              <a:rPr lang="en-AU" sz="2000" dirty="0">
+                <a:solidFill>
+                  <a:schemeClr val="tx1"/>
+                </a:solidFill>
+              </a:rPr>
+              <a:t>4</a:t>
             </a:r>
           </a:p>
         </p:txBody>
@@ -4485,7 +4507,7 @@
         </p:nvSpPr>
         <p:spPr>
           <a:xfrm>
-            <a:off x="8283153" y="70221"/>
+            <a:off x="8283153" y="109410"/>
             <a:ext cx="792000" cy="540000"/>
           </a:xfrm>
           <a:prstGeom prst="rect">
@@ -4945,7 +4967,18 @@
                   <a:schemeClr val="tx1"/>
                 </a:solidFill>
               </a:rPr>
-              <a:t>Story Points</a:t>
+              <a:t>SP</a:t>
+            </a:r>
+          </a:p>
+          <a:p>
+            <a:pPr algn="ctr"/>
+            <a:r>
+              <a:rPr lang="en-AU" sz="2000" dirty="0">
+                <a:solidFill>
+                  <a:schemeClr val="tx1"/>
+                </a:solidFill>
+              </a:rPr>
+              <a:t>8</a:t>
             </a:r>
           </a:p>
         </p:txBody>
@@ -6278,7 +6311,18 @@
                   <a:schemeClr val="tx1"/>
                 </a:solidFill>
               </a:rPr>
-              <a:t>Story Points</a:t>
+              <a:t>SP</a:t>
+            </a:r>
+          </a:p>
+          <a:p>
+            <a:pPr algn="ctr"/>
+            <a:r>
+              <a:rPr lang="en-AU" sz="2000" dirty="0">
+                <a:solidFill>
+                  <a:schemeClr val="tx1"/>
+                </a:solidFill>
+              </a:rPr>
+              <a:t>4</a:t>
             </a:r>
           </a:p>
         </p:txBody>
@@ -6791,7 +6835,18 @@
                   <a:schemeClr val="tx1"/>
                 </a:solidFill>
               </a:rPr>
-              <a:t>Story Points</a:t>
+              <a:t>SP</a:t>
+            </a:r>
+          </a:p>
+          <a:p>
+            <a:pPr algn="ctr"/>
+            <a:r>
+              <a:rPr lang="en-AU" sz="2000" dirty="0">
+                <a:solidFill>
+                  <a:schemeClr val="tx1"/>
+                </a:solidFill>
+              </a:rPr>
+              <a:t>1</a:t>
             </a:r>
           </a:p>
         </p:txBody>
@@ -7284,7 +7339,18 @@
                   <a:schemeClr val="tx1"/>
                 </a:solidFill>
               </a:rPr>
-              <a:t>Story Points</a:t>
+              <a:t>SP</a:t>
+            </a:r>
+          </a:p>
+          <a:p>
+            <a:pPr algn="ctr"/>
+            <a:r>
+              <a:rPr lang="en-AU" sz="2000" dirty="0">
+                <a:solidFill>
+                  <a:schemeClr val="tx1"/>
+                </a:solidFill>
+              </a:rPr>
+              <a:t>1</a:t>
             </a:r>
           </a:p>
         </p:txBody>
@@ -9198,7 +9264,18 @@
                   <a:schemeClr val="tx1"/>
                 </a:solidFill>
               </a:rPr>
-              <a:t>Story Points</a:t>
+              <a:t>SP</a:t>
+            </a:r>
+          </a:p>
+          <a:p>
+            <a:pPr algn="ctr"/>
+            <a:r>
+              <a:rPr lang="en-AU" sz="2000" dirty="0">
+                <a:solidFill>
+                  <a:schemeClr val="tx1"/>
+                </a:solidFill>
+              </a:rPr>
+              <a:t>2</a:t>
             </a:r>
           </a:p>
         </p:txBody>

</xml_diff>

<commit_message>
Added and refined story points and identified releases
</commit_message>
<xml_diff>
--- a/Assessment/Story Cards.pptx
+++ b/Assessment/Story Cards.pptx
@@ -3688,6 +3688,13 @@
   <p:clrMapOvr>
     <a:masterClrMapping/>
   </p:clrMapOvr>
+  <p:timing>
+    <p:tnLst>
+      <p:par>
+        <p:cTn id="1" dur="indefinite" restart="never" nodeType="tmRoot"/>
+      </p:par>
+    </p:tnLst>
+  </p:timing>
 </p:sld>
 </file>
 
@@ -4036,8 +4043,13 @@
                   <a:schemeClr val="tx1"/>
                 </a:solidFill>
               </a:rPr>
-              <a:t>4</a:t>
-            </a:r>
+              <a:t>8</a:t>
+            </a:r>
+            <a:endParaRPr lang="en-AU" sz="2000" dirty="0">
+              <a:solidFill>
+                <a:schemeClr val="tx1"/>
+              </a:solidFill>
+            </a:endParaRPr>
           </a:p>
         </p:txBody>
       </p:sp>
@@ -4167,6 +4179,13 @@
   <p:clrMapOvr>
     <a:masterClrMapping/>
   </p:clrMapOvr>
+  <p:timing>
+    <p:tnLst>
+      <p:par>
+        <p:cTn id="1" dur="indefinite" restart="never" nodeType="tmRoot"/>
+      </p:par>
+    </p:tnLst>
+  </p:timing>
 </p:sld>
 </file>
 
@@ -4639,6 +4658,13 @@
   <p:clrMapOvr>
     <a:masterClrMapping/>
   </p:clrMapOvr>
+  <p:timing>
+    <p:tnLst>
+      <p:par>
+        <p:cTn id="1" dur="indefinite" restart="never" nodeType="tmRoot"/>
+      </p:par>
+    </p:tnLst>
+  </p:timing>
 </p:sld>
 </file>
 
@@ -4973,13 +4999,18 @@
           <a:p>
             <a:pPr algn="ctr"/>
             <a:r>
-              <a:rPr lang="en-AU" sz="2000" dirty="0">
-                <a:solidFill>
-                  <a:schemeClr val="tx1"/>
-                </a:solidFill>
-              </a:rPr>
-              <a:t>8</a:t>
-            </a:r>
+              <a:rPr lang="en-AU" sz="2000" smtClean="0">
+                <a:solidFill>
+                  <a:schemeClr val="tx1"/>
+                </a:solidFill>
+              </a:rPr>
+              <a:t>16</a:t>
+            </a:r>
+            <a:endParaRPr lang="en-AU" sz="2000" dirty="0">
+              <a:solidFill>
+                <a:schemeClr val="tx1"/>
+              </a:solidFill>
+            </a:endParaRPr>
           </a:p>
         </p:txBody>
       </p:sp>
@@ -5109,6 +5140,13 @@
   <p:clrMapOvr>
     <a:masterClrMapping/>
   </p:clrMapOvr>
+  <p:timing>
+    <p:tnLst>
+      <p:par>
+        <p:cTn id="1" dur="indefinite" restart="never" nodeType="tmRoot"/>
+      </p:par>
+    </p:tnLst>
+  </p:timing>
 </p:sld>
 </file>
 
@@ -5974,6 +6012,13 @@
   <p:clrMapOvr>
     <a:masterClrMapping/>
   </p:clrMapOvr>
+  <p:timing>
+    <p:tnLst>
+      <p:par>
+        <p:cTn id="1" dur="indefinite" restart="never" nodeType="tmRoot"/>
+      </p:par>
+    </p:tnLst>
+  </p:timing>
 </p:sld>
 </file>
 
@@ -6487,6 +6532,13 @@
   <p:clrMapOvr>
     <a:masterClrMapping/>
   </p:clrMapOvr>
+  <p:timing>
+    <p:tnLst>
+      <p:par>
+        <p:cTn id="1" dur="indefinite" restart="never" nodeType="tmRoot"/>
+      </p:par>
+    </p:tnLst>
+  </p:timing>
 </p:sld>
 </file>
 
@@ -6991,6 +7043,13 @@
   <p:clrMapOvr>
     <a:masterClrMapping/>
   </p:clrMapOvr>
+  <p:timing>
+    <p:tnLst>
+      <p:par>
+        <p:cTn id="1" dur="indefinite" restart="never" nodeType="tmRoot"/>
+      </p:par>
+    </p:tnLst>
+  </p:timing>
 </p:sld>
 </file>
 
@@ -7495,6 +7554,13 @@
   <p:clrMapOvr>
     <a:masterClrMapping/>
   </p:clrMapOvr>
+  <p:timing>
+    <p:tnLst>
+      <p:par>
+        <p:cTn id="1" dur="indefinite" restart="never" nodeType="tmRoot"/>
+      </p:par>
+    </p:tnLst>
+  </p:timing>
 </p:sld>
 </file>
 
@@ -7838,13 +7904,29 @@
           <a:p>
             <a:pPr algn="ctr"/>
             <a:r>
-              <a:rPr lang="en-AU" sz="2000" dirty="0">
-                <a:solidFill>
-                  <a:schemeClr val="tx1"/>
-                </a:solidFill>
-              </a:rPr>
-              <a:t>Story Points</a:t>
-            </a:r>
+              <a:rPr lang="en-AU" sz="2000" dirty="0" smtClean="0">
+                <a:solidFill>
+                  <a:schemeClr val="tx1"/>
+                </a:solidFill>
+              </a:rPr>
+              <a:t>SP</a:t>
+            </a:r>
+          </a:p>
+          <a:p>
+            <a:pPr algn="ctr"/>
+            <a:r>
+              <a:rPr lang="en-AU" sz="2000" dirty="0" smtClean="0">
+                <a:solidFill>
+                  <a:schemeClr val="tx1"/>
+                </a:solidFill>
+              </a:rPr>
+              <a:t>32</a:t>
+            </a:r>
+            <a:endParaRPr lang="en-AU" sz="2000" dirty="0">
+              <a:solidFill>
+                <a:schemeClr val="tx1"/>
+              </a:solidFill>
+            </a:endParaRPr>
           </a:p>
         </p:txBody>
       </p:sp>
@@ -7993,6 +8075,13 @@
   <p:clrMapOvr>
     <a:masterClrMapping/>
   </p:clrMapOvr>
+  <p:timing>
+    <p:tnLst>
+      <p:par>
+        <p:cTn id="1" dur="indefinite" restart="never" nodeType="tmRoot"/>
+      </p:par>
+    </p:tnLst>
+  </p:timing>
 </p:sld>
 </file>
 
@@ -8344,13 +8433,29 @@
           <a:p>
             <a:pPr algn="ctr"/>
             <a:r>
-              <a:rPr lang="en-AU" sz="2000" dirty="0">
-                <a:solidFill>
-                  <a:schemeClr val="tx1"/>
-                </a:solidFill>
-              </a:rPr>
-              <a:t>Story Points</a:t>
-            </a:r>
+              <a:rPr lang="en-AU" sz="2000" dirty="0" smtClean="0">
+                <a:solidFill>
+                  <a:schemeClr val="tx1"/>
+                </a:solidFill>
+              </a:rPr>
+              <a:t>SP</a:t>
+            </a:r>
+          </a:p>
+          <a:p>
+            <a:pPr algn="ctr"/>
+            <a:r>
+              <a:rPr lang="en-AU" sz="2000" dirty="0" smtClean="0">
+                <a:solidFill>
+                  <a:schemeClr val="tx1"/>
+                </a:solidFill>
+              </a:rPr>
+              <a:t>16</a:t>
+            </a:r>
+            <a:endParaRPr lang="en-AU" sz="2000" dirty="0">
+              <a:solidFill>
+                <a:schemeClr val="tx1"/>
+              </a:solidFill>
+            </a:endParaRPr>
           </a:p>
         </p:txBody>
       </p:sp>
@@ -8479,8 +8584,35 @@
                   <a:schemeClr val="tx1"/>
                 </a:solidFill>
               </a:rPr>
-              <a:t>Mobile devices (phones or tablets) may need to be supplied by the department in this case.</a:t>
-            </a:r>
+              <a:t>Mobile devices (phones or tablets) may need to be supplied by the department in this case</a:t>
+            </a:r>
+            <a:r>
+              <a:rPr lang="en-AU" sz="2000" dirty="0" smtClean="0">
+                <a:solidFill>
+                  <a:schemeClr val="tx1"/>
+                </a:solidFill>
+              </a:rPr>
+              <a:t>.</a:t>
+            </a:r>
+          </a:p>
+          <a:p>
+            <a:pPr marL="179388" indent="-179388">
+              <a:buFont typeface="Arial" pitchFamily="34" charset="0"/>
+              <a:buChar char="•"/>
+            </a:pPr>
+            <a:r>
+              <a:rPr lang="en-AU" sz="2000" dirty="0" smtClean="0">
+                <a:solidFill>
+                  <a:srgbClr val="FF0000"/>
+                </a:solidFill>
+              </a:rPr>
+              <a:t>Mobile only?</a:t>
+            </a:r>
+            <a:endParaRPr lang="en-AU" sz="2000" dirty="0">
+              <a:solidFill>
+                <a:srgbClr val="FF0000"/>
+              </a:solidFill>
+            </a:endParaRPr>
           </a:p>
         </p:txBody>
       </p:sp>
@@ -8494,6 +8626,13 @@
   <p:clrMapOvr>
     <a:masterClrMapping/>
   </p:clrMapOvr>
+  <p:timing>
+    <p:tnLst>
+      <p:par>
+        <p:cTn id="1" dur="indefinite" restart="never" nodeType="tmRoot"/>
+      </p:par>
+    </p:tnLst>
+  </p:timing>
 </p:sld>
 </file>
 
@@ -8805,13 +8944,29 @@
           <a:p>
             <a:pPr algn="ctr"/>
             <a:r>
-              <a:rPr lang="en-AU" sz="2000" dirty="0">
-                <a:solidFill>
-                  <a:schemeClr val="tx1"/>
-                </a:solidFill>
-              </a:rPr>
-              <a:t>Story Points</a:t>
-            </a:r>
+              <a:rPr lang="en-AU" sz="2000" dirty="0" smtClean="0">
+                <a:solidFill>
+                  <a:schemeClr val="tx1"/>
+                </a:solidFill>
+              </a:rPr>
+              <a:t>SP</a:t>
+            </a:r>
+          </a:p>
+          <a:p>
+            <a:pPr algn="ctr"/>
+            <a:r>
+              <a:rPr lang="en-AU" sz="2000" dirty="0" smtClean="0">
+                <a:solidFill>
+                  <a:schemeClr val="tx1"/>
+                </a:solidFill>
+              </a:rPr>
+              <a:t>16</a:t>
+            </a:r>
+            <a:endParaRPr lang="en-AU" sz="2000" dirty="0">
+              <a:solidFill>
+                <a:schemeClr val="tx1"/>
+              </a:solidFill>
+            </a:endParaRPr>
           </a:p>
         </p:txBody>
       </p:sp>
@@ -8948,6 +9103,13 @@
   <p:clrMapOvr>
     <a:masterClrMapping/>
   </p:clrMapOvr>
+  <p:timing>
+    <p:tnLst>
+      <p:par>
+        <p:cTn id="1" dur="indefinite" restart="never" nodeType="tmRoot"/>
+      </p:par>
+    </p:tnLst>
+  </p:timing>
 </p:sld>
 </file>
 
@@ -9275,8 +9437,13 @@
                   <a:schemeClr val="tx1"/>
                 </a:solidFill>
               </a:rPr>
-              <a:t>2</a:t>
-            </a:r>
+              <a:t>4</a:t>
+            </a:r>
+            <a:endParaRPr lang="en-AU" sz="2000" dirty="0">
+              <a:solidFill>
+                <a:schemeClr val="tx1"/>
+              </a:solidFill>
+            </a:endParaRPr>
           </a:p>
         </p:txBody>
       </p:sp>
@@ -9420,6 +9587,13 @@
   <p:clrMapOvr>
     <a:masterClrMapping/>
   </p:clrMapOvr>
+  <p:timing>
+    <p:tnLst>
+      <p:par>
+        <p:cTn id="1" dur="indefinite" restart="never" nodeType="tmRoot"/>
+      </p:par>
+    </p:tnLst>
+  </p:timing>
 </p:sld>
 </file>
 
@@ -9752,13 +9926,29 @@
           <a:p>
             <a:pPr algn="ctr"/>
             <a:r>
-              <a:rPr lang="en-AU" sz="2000" dirty="0">
-                <a:solidFill>
-                  <a:schemeClr val="tx1"/>
-                </a:solidFill>
-              </a:rPr>
-              <a:t>Story Points</a:t>
-            </a:r>
+              <a:rPr lang="en-AU" sz="2000" dirty="0" smtClean="0">
+                <a:solidFill>
+                  <a:schemeClr val="tx1"/>
+                </a:solidFill>
+              </a:rPr>
+              <a:t>SP</a:t>
+            </a:r>
+          </a:p>
+          <a:p>
+            <a:pPr algn="ctr"/>
+            <a:r>
+              <a:rPr lang="en-AU" sz="2000" dirty="0" smtClean="0">
+                <a:solidFill>
+                  <a:schemeClr val="tx1"/>
+                </a:solidFill>
+              </a:rPr>
+              <a:t>16</a:t>
+            </a:r>
+            <a:endParaRPr lang="en-AU" sz="2000" dirty="0">
+              <a:solidFill>
+                <a:schemeClr val="tx1"/>
+              </a:solidFill>
+            </a:endParaRPr>
           </a:p>
         </p:txBody>
       </p:sp>
@@ -9907,6 +10097,13 @@
   <p:clrMapOvr>
     <a:masterClrMapping/>
   </p:clrMapOvr>
+  <p:timing>
+    <p:tnLst>
+      <p:par>
+        <p:cTn id="1" dur="indefinite" restart="never" nodeType="tmRoot"/>
+      </p:par>
+    </p:tnLst>
+  </p:timing>
 </p:sld>
 </file>
 

</xml_diff>

<commit_message>
Made some major changes to user stories, release and sprint 1 plans
</commit_message>
<xml_diff>
--- a/Assessment/Story Cards.pptx
+++ b/Assessment/Story Cards.pptx
@@ -5,7 +5,7 @@
     <p:sldMasterId id="2147483648" r:id="rId1"/>
   </p:sldMasterIdLst>
   <p:notesMasterIdLst>
-    <p:notesMasterId r:id="rId15"/>
+    <p:notesMasterId r:id="rId18"/>
   </p:notesMasterIdLst>
   <p:sldIdLst>
     <p:sldId id="258" r:id="rId2"/>
@@ -20,7 +20,10 @@
     <p:sldId id="269" r:id="rId11"/>
     <p:sldId id="266" r:id="rId12"/>
     <p:sldId id="270" r:id="rId13"/>
-    <p:sldId id="267" r:id="rId14"/>
+    <p:sldId id="271" r:id="rId14"/>
+    <p:sldId id="272" r:id="rId15"/>
+    <p:sldId id="273" r:id="rId16"/>
+    <p:sldId id="274" r:id="rId17"/>
   </p:sldIdLst>
   <p:sldSz cx="9906000" cy="6858000" type="A4"/>
   <p:notesSz cx="6858000" cy="9144000"/>
@@ -220,7 +223,7 @@
           <a:p>
             <a:fld id="{BBDCA08C-34F0-41AE-AAA6-F23942C36312}" type="datetimeFigureOut">
               <a:rPr lang="en-AU" smtClean="0"/>
-              <a:t>18/08/2016</a:t>
+              <a:t>24/08/2016</a:t>
             </a:fld>
             <a:endParaRPr lang="en-AU"/>
           </a:p>
@@ -488,144 +491,6 @@
 </p:notesMaster>
 </file>
 
-<file path=ppt/notesSlides/notesSlide1.xml><?xml version="1.0" encoding="utf-8"?>
-<p:notes xmlns:a="http://schemas.openxmlformats.org/drawingml/2006/main" xmlns:r="http://schemas.openxmlformats.org/officeDocument/2006/relationships" xmlns:p="http://schemas.openxmlformats.org/presentationml/2006/main">
-  <p:cSld>
-    <p:spTree>
-      <p:nvGrpSpPr>
-        <p:cNvPr id="1" name=""/>
-        <p:cNvGrpSpPr/>
-        <p:nvPr/>
-      </p:nvGrpSpPr>
-      <p:grpSpPr>
-        <a:xfrm>
-          <a:off x="0" y="0"/>
-          <a:ext cx="0" cy="0"/>
-          <a:chOff x="0" y="0"/>
-          <a:chExt cx="0" cy="0"/>
-        </a:xfrm>
-      </p:grpSpPr>
-      <p:sp>
-        <p:nvSpPr>
-          <p:cNvPr id="2" name="Slide Image Placeholder 1"/>
-          <p:cNvSpPr>
-            <a:spLocks noGrp="1" noRot="1" noChangeAspect="1"/>
-          </p:cNvSpPr>
-          <p:nvPr>
-            <p:ph type="sldImg"/>
-          </p:nvPr>
-        </p:nvSpPr>
-        <p:spPr/>
-      </p:sp>
-      <p:sp>
-        <p:nvSpPr>
-          <p:cNvPr id="3" name="Notes Placeholder 2"/>
-          <p:cNvSpPr>
-            <a:spLocks noGrp="1"/>
-          </p:cNvSpPr>
-          <p:nvPr>
-            <p:ph type="body" idx="1"/>
-          </p:nvPr>
-        </p:nvSpPr>
-        <p:spPr/>
-        <p:txBody>
-          <a:bodyPr/>
-          <a:lstStyle/>
-          <a:p>
-            <a:endParaRPr lang="en-US" dirty="0"/>
-          </a:p>
-        </p:txBody>
-      </p:sp>
-      <p:sp>
-        <p:nvSpPr>
-          <p:cNvPr id="4" name="Slide Number Placeholder 3"/>
-          <p:cNvSpPr>
-            <a:spLocks noGrp="1"/>
-          </p:cNvSpPr>
-          <p:nvPr>
-            <p:ph type="sldNum" sz="quarter" idx="10"/>
-          </p:nvPr>
-        </p:nvSpPr>
-        <p:spPr/>
-        <p:txBody>
-          <a:bodyPr/>
-          <a:lstStyle/>
-          <a:p>
-            <a:pPr marL="0" marR="0" lvl="0" indent="0" defTabSz="914400" eaLnBrk="1" fontAlgn="auto" latinLnBrk="0" hangingPunct="1">
-              <a:lnSpc>
-                <a:spcPct val="100000"/>
-              </a:lnSpc>
-              <a:spcBef>
-                <a:spcPts val="0"/>
-              </a:spcBef>
-              <a:spcAft>
-                <a:spcPts val="0"/>
-              </a:spcAft>
-              <a:buClrTx/>
-              <a:buSzTx/>
-              <a:buFontTx/>
-              <a:buNone/>
-              <a:tabLst/>
-              <a:defRPr/>
-            </a:pPr>
-            <a:fld id="{4C36CA0F-EEA6-48BF-9968-70F348134116}" type="slidenum">
-              <a:rPr kumimoji="0" lang="en-US" sz="1800" b="0" i="0" u="none" strike="noStrike" kern="0" cap="none" spc="0" normalizeH="0" baseline="0" noProof="0" smtClean="0">
-                <a:ln>
-                  <a:noFill/>
-                </a:ln>
-                <a:solidFill>
-                  <a:sysClr val="windowText" lastClr="000000"/>
-                </a:solidFill>
-                <a:effectLst/>
-                <a:uLnTx/>
-                <a:uFillTx/>
-              </a:rPr>
-              <a:pPr marL="0" marR="0" lvl="0" indent="0" defTabSz="914400" eaLnBrk="1" fontAlgn="auto" latinLnBrk="0" hangingPunct="1">
-                <a:lnSpc>
-                  <a:spcPct val="100000"/>
-                </a:lnSpc>
-                <a:spcBef>
-                  <a:spcPts val="0"/>
-                </a:spcBef>
-                <a:spcAft>
-                  <a:spcPts val="0"/>
-                </a:spcAft>
-                <a:buClrTx/>
-                <a:buSzTx/>
-                <a:buFontTx/>
-                <a:buNone/>
-                <a:tabLst/>
-                <a:defRPr/>
-              </a:pPr>
-              <a:t>13</a:t>
-            </a:fld>
-            <a:endParaRPr kumimoji="0" lang="en-US" sz="1800" b="0" i="0" u="none" strike="noStrike" kern="0" cap="none" spc="0" normalizeH="0" baseline="0" noProof="0">
-              <a:ln>
-                <a:noFill/>
-              </a:ln>
-              <a:solidFill>
-                <a:sysClr val="windowText" lastClr="000000"/>
-              </a:solidFill>
-              <a:effectLst/>
-              <a:uLnTx/>
-              <a:uFillTx/>
-            </a:endParaRPr>
-          </a:p>
-        </p:txBody>
-      </p:sp>
-    </p:spTree>
-    <p:extLst>
-      <p:ext uri="{BB962C8B-B14F-4D97-AF65-F5344CB8AC3E}">
-        <p14:creationId xmlns:p14="http://schemas.microsoft.com/office/powerpoint/2010/main" val="3402903724"/>
-      </p:ext>
-    </p:extLst>
-  </p:cSld>
-  <p:clrMapOvr>
-    <a:masterClrMapping/>
-  </p:clrMapOvr>
-</p:notes>
-</file>
-
 <file path=ppt/slideLayouts/slideLayout1.xml><?xml version="1.0" encoding="utf-8"?>
 <p:sldLayout xmlns:a="http://schemas.openxmlformats.org/drawingml/2006/main" xmlns:r="http://schemas.openxmlformats.org/officeDocument/2006/relationships" xmlns:p="http://schemas.openxmlformats.org/presentationml/2006/main" type="title" preserve="1">
   <p:cSld name="Title Slide">
@@ -808,7 +673,7 @@
             <a:fld id="{1585DAA5-6BE2-467A-90B2-00E985D86198}" type="datetimeFigureOut">
               <a:rPr lang="en-AU" smtClean="0"/>
               <a:pPr/>
-              <a:t>18/08/2016</a:t>
+              <a:t>24/08/2016</a:t>
             </a:fld>
             <a:endParaRPr lang="en-AU"/>
           </a:p>
@@ -975,7 +840,7 @@
             <a:fld id="{1585DAA5-6BE2-467A-90B2-00E985D86198}" type="datetimeFigureOut">
               <a:rPr lang="en-AU" smtClean="0"/>
               <a:pPr/>
-              <a:t>18/08/2016</a:t>
+              <a:t>24/08/2016</a:t>
             </a:fld>
             <a:endParaRPr lang="en-AU"/>
           </a:p>
@@ -1152,7 +1017,7 @@
             <a:fld id="{1585DAA5-6BE2-467A-90B2-00E985D86198}" type="datetimeFigureOut">
               <a:rPr lang="en-AU" smtClean="0"/>
               <a:pPr/>
-              <a:t>18/08/2016</a:t>
+              <a:t>24/08/2016</a:t>
             </a:fld>
             <a:endParaRPr lang="en-AU"/>
           </a:p>
@@ -1319,7 +1184,7 @@
             <a:fld id="{1585DAA5-6BE2-467A-90B2-00E985D86198}" type="datetimeFigureOut">
               <a:rPr lang="en-AU" smtClean="0"/>
               <a:pPr/>
-              <a:t>18/08/2016</a:t>
+              <a:t>24/08/2016</a:t>
             </a:fld>
             <a:endParaRPr lang="en-AU"/>
           </a:p>
@@ -1562,7 +1427,7 @@
             <a:fld id="{1585DAA5-6BE2-467A-90B2-00E985D86198}" type="datetimeFigureOut">
               <a:rPr lang="en-AU" smtClean="0"/>
               <a:pPr/>
-              <a:t>18/08/2016</a:t>
+              <a:t>24/08/2016</a:t>
             </a:fld>
             <a:endParaRPr lang="en-AU"/>
           </a:p>
@@ -1847,7 +1712,7 @@
             <a:fld id="{1585DAA5-6BE2-467A-90B2-00E985D86198}" type="datetimeFigureOut">
               <a:rPr lang="en-AU" smtClean="0"/>
               <a:pPr/>
-              <a:t>18/08/2016</a:t>
+              <a:t>24/08/2016</a:t>
             </a:fld>
             <a:endParaRPr lang="en-AU"/>
           </a:p>
@@ -2266,7 +2131,7 @@
             <a:fld id="{1585DAA5-6BE2-467A-90B2-00E985D86198}" type="datetimeFigureOut">
               <a:rPr lang="en-AU" smtClean="0"/>
               <a:pPr/>
-              <a:t>18/08/2016</a:t>
+              <a:t>24/08/2016</a:t>
             </a:fld>
             <a:endParaRPr lang="en-AU"/>
           </a:p>
@@ -2381,7 +2246,7 @@
             <a:fld id="{1585DAA5-6BE2-467A-90B2-00E985D86198}" type="datetimeFigureOut">
               <a:rPr lang="en-AU" smtClean="0"/>
               <a:pPr/>
-              <a:t>18/08/2016</a:t>
+              <a:t>24/08/2016</a:t>
             </a:fld>
             <a:endParaRPr lang="en-AU"/>
           </a:p>
@@ -2473,7 +2338,7 @@
             <a:fld id="{1585DAA5-6BE2-467A-90B2-00E985D86198}" type="datetimeFigureOut">
               <a:rPr lang="en-AU" smtClean="0"/>
               <a:pPr/>
-              <a:t>18/08/2016</a:t>
+              <a:t>24/08/2016</a:t>
             </a:fld>
             <a:endParaRPr lang="en-AU"/>
           </a:p>
@@ -2747,7 +2612,7 @@
             <a:fld id="{1585DAA5-6BE2-467A-90B2-00E985D86198}" type="datetimeFigureOut">
               <a:rPr lang="en-AU" smtClean="0"/>
               <a:pPr/>
-              <a:t>18/08/2016</a:t>
+              <a:t>24/08/2016</a:t>
             </a:fld>
             <a:endParaRPr lang="en-AU"/>
           </a:p>
@@ -2997,7 +2862,7 @@
             <a:fld id="{1585DAA5-6BE2-467A-90B2-00E985D86198}" type="datetimeFigureOut">
               <a:rPr lang="en-AU" smtClean="0"/>
               <a:pPr/>
-              <a:t>18/08/2016</a:t>
+              <a:t>24/08/2016</a:t>
             </a:fld>
             <a:endParaRPr lang="en-AU"/>
           </a:p>
@@ -3207,7 +3072,7 @@
             <a:fld id="{1585DAA5-6BE2-467A-90B2-00E985D86198}" type="datetimeFigureOut">
               <a:rPr lang="en-AU" smtClean="0"/>
               <a:pPr/>
-              <a:t>18/08/2016</a:t>
+              <a:t>24/08/2016</a:t>
             </a:fld>
             <a:endParaRPr lang="en-AU"/>
           </a:p>
@@ -3886,9 +3751,10 @@
           <a:p>
             <a:pPr algn="ctr"/>
             <a:r>
-              <a:rPr lang="en-AU" sz="2800" dirty="0"/>
-              <a:t>Viewing Parking/Health Violations</a:t>
-            </a:r>
+              <a:rPr lang="en-AU" sz="2800" dirty="0" smtClean="0"/>
+              <a:t>Finding a user’s permits and violations</a:t>
+            </a:r>
+            <a:endParaRPr lang="en-AU" sz="2800" dirty="0"/>
           </a:p>
         </p:txBody>
       </p:sp>
@@ -3946,8 +3812,21 @@
                   <a:schemeClr val="tx1"/>
                 </a:solidFill>
               </a:rPr>
-              <a:t>As a department employee I want a way to view the parking permit or health violations associated with any individual.</a:t>
-            </a:r>
+              <a:t>As a department employee I want </a:t>
+            </a:r>
+            <a:r>
+              <a:rPr lang="en-AU" sz="2400" dirty="0" smtClean="0">
+                <a:solidFill>
+                  <a:schemeClr val="tx1"/>
+                </a:solidFill>
+              </a:rPr>
+              <a:t>to be able to search for and view a user’s information so I can find out what parking permits and health violations they have associated with them.</a:t>
+            </a:r>
+            <a:endParaRPr lang="en-AU" sz="2400" dirty="0">
+              <a:solidFill>
+                <a:schemeClr val="tx1"/>
+              </a:solidFill>
+            </a:endParaRPr>
           </a:p>
           <a:p>
             <a:endParaRPr lang="en-AU" sz="2400" dirty="0">
@@ -4851,9 +4730,10 @@
           <a:p>
             <a:pPr algn="ctr"/>
             <a:r>
-              <a:rPr lang="en-AU" sz="2800" dirty="0"/>
-              <a:t>Handling Unpaid Fines</a:t>
-            </a:r>
+              <a:rPr lang="en-AU" sz="2800" dirty="0" smtClean="0"/>
+              <a:t>Unpaid fine notifications</a:t>
+            </a:r>
+            <a:endParaRPr lang="en-AU" sz="2800" dirty="0"/>
           </a:p>
         </p:txBody>
       </p:sp>
@@ -5277,43 +5157,34 @@
           <a:bodyPr wrap="square" lIns="0" rIns="0" rtlCol="0" anchor="ctr"/>
           <a:lstStyle/>
           <a:p>
-            <a:pPr marL="0" marR="0" lvl="0" indent="0" algn="ctr" defTabSz="914400" eaLnBrk="1" fontAlgn="auto" latinLnBrk="0" hangingPunct="1">
-              <a:lnSpc>
-                <a:spcPct val="100000"/>
-              </a:lnSpc>
-              <a:spcBef>
-                <a:spcPts val="0"/>
-              </a:spcBef>
-              <a:spcAft>
-                <a:spcPts val="0"/>
-              </a:spcAft>
-              <a:buClrTx/>
-              <a:buSzTx/>
-              <a:buFontTx/>
-              <a:buNone/>
-              <a:tabLst/>
-              <a:defRPr/>
-            </a:pPr>
-            <a:r>
-              <a:rPr kumimoji="0" lang="en-AU" sz="2000" b="0" i="0" u="none" strike="noStrike" kern="0" cap="none" spc="0" normalizeH="0" baseline="0" noProof="0" dirty="0">
-                <a:ln>
-                  <a:noFill/>
-                </a:ln>
-                <a:solidFill>
-                  <a:schemeClr val="tx1"/>
-                </a:solidFill>
-                <a:effectLst/>
-                <a:uLnTx/>
-                <a:uFillTx/>
-              </a:rPr>
-              <a:t>Story 12</a:t>
-            </a:r>
-          </a:p>
-        </p:txBody>
-      </p:sp>
-      <p:sp>
-        <p:nvSpPr>
-          <p:cNvPr id="6" name="Rectangle 5"/>
+            <a:pPr algn="ctr"/>
+            <a:r>
+              <a:rPr lang="en-AU" sz="2000" dirty="0">
+                <a:solidFill>
+                  <a:schemeClr val="tx1"/>
+                </a:solidFill>
+              </a:rPr>
+              <a:t>Story </a:t>
+            </a:r>
+            <a:r>
+              <a:rPr lang="en-AU" sz="2000" dirty="0" smtClean="0">
+                <a:solidFill>
+                  <a:schemeClr val="tx1"/>
+                </a:solidFill>
+              </a:rPr>
+              <a:t>12</a:t>
+            </a:r>
+            <a:endParaRPr lang="en-AU" sz="2000" dirty="0">
+              <a:solidFill>
+                <a:schemeClr val="tx1"/>
+              </a:solidFill>
+            </a:endParaRPr>
+          </a:p>
+        </p:txBody>
+      </p:sp>
+      <p:sp>
+        <p:nvSpPr>
+          <p:cNvPr id="5" name="Rectangle 4"/>
           <p:cNvSpPr/>
           <p:nvPr/>
         </p:nvSpPr>
@@ -5353,49 +5224,28 @@
           <a:bodyPr rtlCol="0" anchor="ctr"/>
           <a:lstStyle/>
           <a:p>
-            <a:pPr marL="0" marR="0" lvl="0" indent="0" algn="ctr" defTabSz="914400" eaLnBrk="1" fontAlgn="auto" latinLnBrk="0" hangingPunct="1">
-              <a:lnSpc>
-                <a:spcPct val="100000"/>
-              </a:lnSpc>
-              <a:spcBef>
-                <a:spcPts val="0"/>
-              </a:spcBef>
-              <a:spcAft>
-                <a:spcPts val="0"/>
-              </a:spcAft>
-              <a:buClrTx/>
-              <a:buSzTx/>
-              <a:buFontTx/>
-              <a:buNone/>
-              <a:tabLst/>
-              <a:defRPr/>
-            </a:pPr>
-            <a:r>
-              <a:rPr kumimoji="0" lang="en-AU" sz="2800" b="0" i="0" u="none" strike="noStrike" kern="0" cap="none" spc="0" normalizeH="0" baseline="0" noProof="0" dirty="0">
-                <a:ln>
-                  <a:noFill/>
-                </a:ln>
-                <a:solidFill>
-                  <a:schemeClr val="bg1"/>
-                </a:solidFill>
-                <a:effectLst/>
-                <a:uLnTx/>
-                <a:uFillTx/>
-              </a:rPr>
-              <a:t>Disabled user</a:t>
-            </a:r>
-          </a:p>
-        </p:txBody>
-      </p:sp>
-      <p:sp>
-        <p:nvSpPr>
-          <p:cNvPr id="7" name="Rectangle 6"/>
+            <a:pPr algn="ctr"/>
+            <a:r>
+              <a:rPr lang="en-AU" sz="2800" dirty="0" smtClean="0"/>
+              <a:t>Secure and available </a:t>
+            </a:r>
+            <a:r>
+              <a:rPr lang="en-AU" sz="2800" dirty="0" smtClean="0"/>
+              <a:t>permits </a:t>
+            </a:r>
+            <a:endParaRPr lang="en-AU" sz="2800" dirty="0"/>
+          </a:p>
+        </p:txBody>
+      </p:sp>
+      <p:sp>
+        <p:nvSpPr>
+          <p:cNvPr id="6" name="Rectangle 5"/>
           <p:cNvSpPr/>
           <p:nvPr/>
         </p:nvSpPr>
         <p:spPr>
           <a:xfrm>
-            <a:off x="50039" y="822470"/>
+            <a:off x="39153" y="822470"/>
             <a:ext cx="9828000" cy="2340000"/>
           </a:xfrm>
           <a:prstGeom prst="rect">
@@ -5435,177 +5285,49 @@
           <a:bodyPr rtlCol="0" anchor="t" anchorCtr="0"/>
           <a:lstStyle/>
           <a:p>
-            <a:pPr marL="0" marR="0" lvl="0" indent="0" defTabSz="914400" eaLnBrk="1" fontAlgn="auto" latinLnBrk="0" hangingPunct="1">
-              <a:lnSpc>
-                <a:spcPct val="100000"/>
-              </a:lnSpc>
-              <a:spcBef>
-                <a:spcPts val="0"/>
-              </a:spcBef>
-              <a:spcAft>
-                <a:spcPts val="0"/>
-              </a:spcAft>
-              <a:buClrTx/>
-              <a:buSzTx/>
-              <a:buFontTx/>
-              <a:buNone/>
-              <a:tabLst/>
-              <a:defRPr/>
-            </a:pPr>
-            <a:r>
-              <a:rPr kumimoji="0" lang="en-AU" sz="2400" b="0" i="0" u="none" strike="noStrike" kern="0" cap="none" spc="0" normalizeH="0" baseline="0" noProof="0" dirty="0">
-                <a:ln>
-                  <a:noFill/>
-                </a:ln>
-                <a:solidFill>
-                  <a:schemeClr val="tx1"/>
-                </a:solidFill>
-                <a:effectLst/>
-                <a:uLnTx/>
-                <a:uFillTx/>
-              </a:rPr>
-              <a:t>As someone with a disability I </a:t>
-            </a:r>
-            <a:r>
-              <a:rPr lang="en-AU" sz="2400" kern="0" dirty="0">
-                <a:solidFill>
-                  <a:schemeClr val="tx1"/>
-                </a:solidFill>
-              </a:rPr>
-              <a:t>would like parking spaces close to the entry to be reserved for people with disabilities to allow us easier</a:t>
-            </a:r>
-            <a:r>
-              <a:rPr kumimoji="0" lang="en-US" sz="2400" b="0" i="0" u="none" strike="noStrike" kern="0" cap="none" spc="0" normalizeH="0" baseline="0" noProof="0" dirty="0">
-                <a:ln>
-                  <a:noFill/>
-                </a:ln>
-                <a:solidFill>
-                  <a:schemeClr val="tx1"/>
-                </a:solidFill>
-                <a:effectLst/>
-                <a:uLnTx/>
-                <a:uFillTx/>
-              </a:rPr>
-              <a:t> access to buildings.</a:t>
-            </a:r>
-          </a:p>
-          <a:p>
-            <a:pPr marL="0" marR="0" lvl="0" indent="0" defTabSz="914400" eaLnBrk="1" fontAlgn="auto" latinLnBrk="0" hangingPunct="1">
-              <a:lnSpc>
-                <a:spcPct val="100000"/>
-              </a:lnSpc>
-              <a:spcBef>
-                <a:spcPts val="0"/>
-              </a:spcBef>
-              <a:spcAft>
-                <a:spcPts val="0"/>
-              </a:spcAft>
-              <a:buClrTx/>
-              <a:buSzTx/>
-              <a:buFontTx/>
-              <a:buNone/>
-              <a:tabLst/>
-              <a:defRPr/>
-            </a:pPr>
-            <a:endParaRPr lang="en-US" sz="2400" kern="0" dirty="0">
+            <a:r>
+              <a:rPr lang="en-AU" sz="2400" dirty="0">
+                <a:solidFill>
+                  <a:schemeClr val="tx1"/>
+                </a:solidFill>
+              </a:rPr>
+              <a:t>As a </a:t>
+            </a:r>
+            <a:r>
+              <a:rPr lang="en-AU" sz="2400" dirty="0" smtClean="0">
+                <a:solidFill>
+                  <a:schemeClr val="tx1"/>
+                </a:solidFill>
+              </a:rPr>
+              <a:t>staff member, </a:t>
+            </a:r>
+            <a:r>
+              <a:rPr lang="en-AU" sz="2400" dirty="0" smtClean="0">
+                <a:solidFill>
+                  <a:schemeClr val="tx1"/>
+                </a:solidFill>
+              </a:rPr>
+              <a:t>student or visitor I want my permit stored securely so my permit cannot be stolen or lost</a:t>
+            </a:r>
+            <a:r>
+              <a:rPr lang="en-AU" sz="2400" dirty="0" smtClean="0">
+                <a:solidFill>
+                  <a:schemeClr val="tx1"/>
+                </a:solidFill>
+              </a:rPr>
+              <a:t>.</a:t>
+            </a:r>
+            <a:endParaRPr lang="en-AU" sz="2400" dirty="0">
               <a:solidFill>
                 <a:schemeClr val="tx1"/>
               </a:solidFill>
             </a:endParaRPr>
           </a:p>
-          <a:p>
-            <a:pPr lvl="0">
-              <a:defRPr/>
-            </a:pPr>
-            <a:r>
-              <a:rPr kumimoji="0" lang="en-US" sz="2400" b="0" i="0" u="none" strike="noStrike" kern="0" cap="none" spc="0" normalizeH="0" baseline="0" noProof="0" dirty="0">
-                <a:ln>
-                  <a:noFill/>
-                </a:ln>
-                <a:solidFill>
-                  <a:srgbClr val="FF0000"/>
-                </a:solidFill>
-                <a:effectLst/>
-                <a:uLnTx/>
-                <a:uFillTx/>
-              </a:rPr>
-              <a:t>(This</a:t>
-            </a:r>
-            <a:r>
-              <a:rPr kumimoji="0" lang="en-US" sz="2400" b="0" i="0" u="none" strike="noStrike" kern="0" cap="none" spc="0" normalizeH="0" noProof="0" dirty="0">
-                <a:ln>
-                  <a:noFill/>
-                </a:ln>
-                <a:solidFill>
-                  <a:srgbClr val="FF0000"/>
-                </a:solidFill>
-                <a:effectLst/>
-                <a:uLnTx/>
-                <a:uFillTx/>
-              </a:rPr>
-              <a:t> is a ver</a:t>
-            </a:r>
-            <a:r>
-              <a:rPr lang="en-US" sz="2400" kern="0" dirty="0">
-                <a:solidFill>
-                  <a:srgbClr val="FF0000"/>
-                </a:solidFill>
-              </a:rPr>
-              <a:t>y ambiguous story. Do you mean reserved for staff spaces, or dedicated reserved for handicapped spaces?</a:t>
-            </a:r>
-            <a:r>
-              <a:rPr kumimoji="0" lang="en-US" sz="2400" b="0" i="0" u="none" strike="noStrike" kern="0" cap="none" spc="0" normalizeH="0" baseline="0" noProof="0" dirty="0">
-                <a:ln>
-                  <a:noFill/>
-                </a:ln>
-                <a:solidFill>
-                  <a:srgbClr val="FF0000"/>
-                </a:solidFill>
-                <a:effectLst/>
-                <a:uLnTx/>
-                <a:uFillTx/>
-              </a:rPr>
-              <a:t>) </a:t>
-            </a:r>
-            <a:r>
-              <a:rPr kumimoji="0" lang="en-US" sz="2400" b="0" i="0" u="none" strike="noStrike" kern="0" cap="none" spc="0" normalizeH="0" baseline="0" noProof="0" dirty="0">
-                <a:ln>
-                  <a:noFill/>
-                </a:ln>
-                <a:solidFill>
-                  <a:schemeClr val="tx1"/>
-                </a:solidFill>
-                <a:effectLst/>
-                <a:uLnTx/>
-                <a:uFillTx/>
-              </a:rPr>
-              <a:t>“</a:t>
-            </a:r>
-            <a:r>
-              <a:rPr lang="en-AU" sz="2400" kern="0" dirty="0">
-                <a:solidFill>
-                  <a:schemeClr val="tx1"/>
-                </a:solidFill>
-              </a:rPr>
-              <a:t>Parking close to exits and access to buildings would be reserved for persons with a disability “</a:t>
-            </a:r>
-            <a:endParaRPr kumimoji="0" lang="en-AU" sz="2400" b="0" i="0" u="none" strike="noStrike" kern="0" cap="none" spc="0" normalizeH="0" baseline="0" noProof="0" dirty="0">
-              <a:ln>
-                <a:noFill/>
-              </a:ln>
-              <a:solidFill>
-                <a:srgbClr val="FF0000"/>
-              </a:solidFill>
-              <a:effectLst/>
-              <a:uLnTx/>
-              <a:uFillTx/>
-            </a:endParaRPr>
-          </a:p>
-        </p:txBody>
-      </p:sp>
-      <p:sp>
-        <p:nvSpPr>
-          <p:cNvPr id="8" name="Rectangle 7"/>
+        </p:txBody>
+      </p:sp>
+      <p:sp>
+        <p:nvSpPr>
+          <p:cNvPr id="7" name="Rectangle 6"/>
           <p:cNvSpPr/>
           <p:nvPr/>
         </p:nvSpPr>
@@ -5651,363 +5373,39 @@
           <a:bodyPr tIns="36000" rtlCol="0" anchor="t" anchorCtr="0"/>
           <a:lstStyle/>
           <a:p>
-            <a:pPr marL="0" marR="0" lvl="0" indent="0" defTabSz="914400" eaLnBrk="1" fontAlgn="auto" latinLnBrk="0" hangingPunct="1">
-              <a:lnSpc>
-                <a:spcPct val="100000"/>
-              </a:lnSpc>
-              <a:spcBef>
-                <a:spcPts val="0"/>
-              </a:spcBef>
-              <a:spcAft>
-                <a:spcPts val="0"/>
-              </a:spcAft>
-              <a:buClrTx/>
-              <a:buSzTx/>
-              <a:buFontTx/>
-              <a:buNone/>
-              <a:tabLst/>
-              <a:defRPr/>
-            </a:pPr>
-            <a:r>
-              <a:rPr kumimoji="0" lang="en-AU" sz="2000" b="0" i="0" u="none" strike="noStrike" kern="0" cap="none" spc="0" normalizeH="0" baseline="0" noProof="0" dirty="0">
-                <a:ln>
-                  <a:noFill/>
-                </a:ln>
-                <a:solidFill>
-                  <a:schemeClr val="tx1"/>
-                </a:solidFill>
-                <a:effectLst/>
-                <a:uLnTx/>
-                <a:uFillTx/>
+            <a:r>
+              <a:rPr lang="en-AU" sz="2000" dirty="0">
+                <a:solidFill>
+                  <a:schemeClr val="tx1"/>
+                </a:solidFill>
               </a:rPr>
               <a:t>Acceptance Criteria</a:t>
             </a:r>
           </a:p>
           <a:p>
-            <a:pPr marL="179388" marR="0" lvl="0" indent="-179388" defTabSz="914400" eaLnBrk="1" fontAlgn="auto" latinLnBrk="0" hangingPunct="1">
-              <a:lnSpc>
-                <a:spcPct val="100000"/>
-              </a:lnSpc>
-              <a:spcBef>
-                <a:spcPts val="0"/>
-              </a:spcBef>
-              <a:spcAft>
-                <a:spcPts val="0"/>
-              </a:spcAft>
-              <a:buClrTx/>
-              <a:buSzTx/>
+            <a:pPr marL="179388" indent="-179388">
               <a:buFont typeface="Arial" pitchFamily="34" charset="0"/>
               <a:buChar char="•"/>
-              <a:tabLst/>
-              <a:defRPr/>
             </a:pPr>
             <a:r>
-              <a:rPr kumimoji="0" lang="en-AU" sz="2000" b="0" i="0" u="none" strike="noStrike" kern="0" cap="none" spc="0" normalizeH="0" baseline="0" noProof="0" dirty="0">
-                <a:ln>
-                  <a:noFill/>
-                </a:ln>
-                <a:solidFill>
-                  <a:schemeClr val="tx1"/>
-                </a:solidFill>
-                <a:effectLst/>
-                <a:uLnTx/>
-                <a:uFillTx/>
-              </a:rPr>
-              <a:t>Parking close to exits and access to buildings would be reserved for persons with a disability and the officers would check if they are displaying their disabled parking permit.</a:t>
-            </a:r>
-          </a:p>
-          <a:p>
-            <a:pPr marL="179388" marR="0" lvl="0" indent="-179388" defTabSz="914400" eaLnBrk="1" fontAlgn="auto" latinLnBrk="0" hangingPunct="1">
-              <a:lnSpc>
-                <a:spcPct val="100000"/>
-              </a:lnSpc>
-              <a:spcBef>
-                <a:spcPts val="0"/>
-              </a:spcBef>
-              <a:spcAft>
-                <a:spcPts val="0"/>
-              </a:spcAft>
-              <a:buClrTx/>
-              <a:buSzTx/>
-              <a:buFont typeface="Arial" pitchFamily="34" charset="0"/>
-              <a:buChar char="•"/>
-              <a:tabLst/>
-              <a:defRPr/>
-            </a:pPr>
-            <a:r>
-              <a:rPr lang="en-AU" sz="2000" kern="0" dirty="0">
-                <a:solidFill>
-                  <a:srgbClr val="FF0000"/>
-                </a:solidFill>
-              </a:rPr>
-              <a:t>New infraction types will be added to an infraction type field. These new types will </a:t>
-            </a:r>
-            <a:r>
-              <a:rPr lang="en-AU" sz="2000" b="1" u="sng" kern="0" dirty="0">
-                <a:solidFill>
-                  <a:srgbClr val="FF0000"/>
-                </a:solidFill>
-              </a:rPr>
-              <a:t>classes</a:t>
-            </a:r>
-            <a:r>
-              <a:rPr lang="en-AU" sz="2000" kern="0" dirty="0">
-                <a:solidFill>
-                  <a:srgbClr val="FF0000"/>
-                </a:solidFill>
-              </a:rPr>
-              <a:t> based on how many times a previous infraction has occurred.</a:t>
-            </a:r>
-            <a:endParaRPr kumimoji="0" lang="en-AU" sz="2000" b="0" i="0" u="none" strike="noStrike" kern="0" cap="none" spc="0" normalizeH="0" baseline="0" noProof="0" dirty="0">
-              <a:ln>
-                <a:noFill/>
-              </a:ln>
-              <a:solidFill>
-                <a:srgbClr val="FF0000"/>
-              </a:solidFill>
-              <a:effectLst/>
-              <a:uLnTx/>
-              <a:uFillTx/>
-            </a:endParaRPr>
-          </a:p>
-        </p:txBody>
-      </p:sp>
-      <p:sp>
-        <p:nvSpPr>
-          <p:cNvPr id="12" name="Rectangle 11"/>
-          <p:cNvSpPr/>
-          <p:nvPr/>
-        </p:nvSpPr>
-        <p:spPr>
-          <a:xfrm>
-            <a:off x="8283153" y="109410"/>
-            <a:ext cx="792000" cy="540000"/>
-          </a:xfrm>
-          <a:prstGeom prst="rect">
-            <a:avLst/>
-          </a:prstGeom>
-          <a:solidFill>
-            <a:schemeClr val="accent4">
-              <a:lumMod val="20000"/>
-              <a:lumOff val="80000"/>
-            </a:schemeClr>
-          </a:solidFill>
-          <a:ln>
-            <a:solidFill>
-              <a:schemeClr val="accent1">
-                <a:lumMod val="50000"/>
-              </a:schemeClr>
-            </a:solidFill>
-          </a:ln>
-        </p:spPr>
-        <p:style>
-          <a:lnRef idx="2">
-            <a:schemeClr val="accent1">
-              <a:shade val="50000"/>
-            </a:schemeClr>
-          </a:lnRef>
-          <a:fillRef idx="1">
-            <a:schemeClr val="accent1"/>
-          </a:fillRef>
-          <a:effectRef idx="0">
-            <a:schemeClr val="accent1"/>
-          </a:effectRef>
-          <a:fontRef idx="minor">
-            <a:schemeClr val="lt1"/>
-          </a:fontRef>
-        </p:style>
-        <p:txBody>
-          <a:bodyPr wrap="none" lIns="0" rIns="0" rtlCol="0" anchor="ctr"/>
-          <a:lstStyle/>
-          <a:p>
-            <a:pPr marL="0" marR="0" lvl="0" indent="0" algn="ctr" defTabSz="914400" eaLnBrk="1" fontAlgn="auto" latinLnBrk="0" hangingPunct="1">
-              <a:lnSpc>
-                <a:spcPct val="100000"/>
-              </a:lnSpc>
-              <a:spcBef>
-                <a:spcPts val="0"/>
-              </a:spcBef>
-              <a:spcAft>
-                <a:spcPts val="0"/>
-              </a:spcAft>
-              <a:buClrTx/>
-              <a:buSzTx/>
-              <a:buFontTx/>
-              <a:buNone/>
-              <a:tabLst/>
-              <a:defRPr/>
-            </a:pPr>
-            <a:r>
-              <a:rPr lang="en-AU" sz="2000" kern="0" dirty="0">
-                <a:solidFill>
-                  <a:schemeClr val="tx1"/>
-                </a:solidFill>
-              </a:rPr>
-              <a:t>C</a:t>
-            </a:r>
-            <a:endParaRPr kumimoji="0" lang="en-AU" sz="2000" b="0" i="0" u="none" strike="noStrike" kern="0" cap="none" spc="0" normalizeH="0" baseline="0" noProof="0" dirty="0">
-              <a:ln>
-                <a:noFill/>
-              </a:ln>
+              <a:rPr lang="en-AU" sz="2000" dirty="0" smtClean="0">
+                <a:solidFill>
+                  <a:schemeClr val="tx1"/>
+                </a:solidFill>
+              </a:rPr>
+              <a:t>Secure database to prevent any malicious attacks and redundancy added</a:t>
+            </a:r>
+            <a:endParaRPr lang="en-AU" sz="2000" dirty="0">
               <a:solidFill>
                 <a:schemeClr val="tx1"/>
               </a:solidFill>
-              <a:effectLst/>
-              <a:uLnTx/>
-              <a:uFillTx/>
             </a:endParaRPr>
           </a:p>
         </p:txBody>
       </p:sp>
       <p:sp>
         <p:nvSpPr>
-          <p:cNvPr id="13" name="Rectangle 12"/>
-          <p:cNvSpPr/>
-          <p:nvPr/>
-        </p:nvSpPr>
-        <p:spPr>
-          <a:xfrm>
-            <a:off x="39153" y="5139476"/>
-            <a:ext cx="9828000" cy="1620000"/>
-          </a:xfrm>
-          <a:prstGeom prst="rect">
-            <a:avLst/>
-          </a:prstGeom>
-          <a:solidFill>
-            <a:schemeClr val="bg1"/>
-          </a:solidFill>
-          <a:ln>
-            <a:solidFill>
-              <a:schemeClr val="accent1">
-                <a:lumMod val="50000"/>
-              </a:schemeClr>
-            </a:solidFill>
-          </a:ln>
-        </p:spPr>
-        <p:style>
-          <a:lnRef idx="2">
-            <a:schemeClr val="accent1">
-              <a:shade val="50000"/>
-            </a:schemeClr>
-          </a:lnRef>
-          <a:fillRef idx="1">
-            <a:schemeClr val="accent1"/>
-          </a:fillRef>
-          <a:effectRef idx="0">
-            <a:schemeClr val="accent1"/>
-          </a:effectRef>
-          <a:fontRef idx="minor">
-            <a:schemeClr val="lt1"/>
-          </a:fontRef>
-        </p:style>
-        <p:txBody>
-          <a:bodyPr tIns="36000" rtlCol="0" anchor="t" anchorCtr="0"/>
-          <a:lstStyle/>
-          <a:p>
-            <a:pPr marL="0" marR="0" lvl="0" indent="0" defTabSz="914400" eaLnBrk="1" fontAlgn="auto" latinLnBrk="0" hangingPunct="1">
-              <a:lnSpc>
-                <a:spcPct val="100000"/>
-              </a:lnSpc>
-              <a:spcBef>
-                <a:spcPts val="0"/>
-              </a:spcBef>
-              <a:spcAft>
-                <a:spcPts val="0"/>
-              </a:spcAft>
-              <a:buClrTx/>
-              <a:buSzTx/>
-              <a:buFontTx/>
-              <a:buNone/>
-              <a:tabLst/>
-              <a:defRPr/>
-            </a:pPr>
-            <a:r>
-              <a:rPr kumimoji="0" lang="en-AU" sz="2000" b="0" i="0" u="none" strike="noStrike" kern="0" cap="none" spc="0" normalizeH="0" baseline="0" noProof="0" dirty="0">
-                <a:ln>
-                  <a:noFill/>
-                </a:ln>
-                <a:solidFill>
-                  <a:schemeClr val="tx1"/>
-                </a:solidFill>
-                <a:effectLst/>
-                <a:uLnTx/>
-                <a:uFillTx/>
-              </a:rPr>
-              <a:t>Notes</a:t>
-            </a:r>
-          </a:p>
-          <a:p>
-            <a:pPr marL="179388" marR="0" lvl="0" indent="-179388" defTabSz="914400" eaLnBrk="1" fontAlgn="auto" latinLnBrk="0" hangingPunct="1">
-              <a:lnSpc>
-                <a:spcPct val="100000"/>
-              </a:lnSpc>
-              <a:spcBef>
-                <a:spcPts val="0"/>
-              </a:spcBef>
-              <a:spcAft>
-                <a:spcPts val="0"/>
-              </a:spcAft>
-              <a:buClrTx/>
-              <a:buSzTx/>
-              <a:buFont typeface="Arial" pitchFamily="34" charset="0"/>
-              <a:buChar char="•"/>
-              <a:tabLst/>
-              <a:defRPr/>
-            </a:pPr>
-            <a:r>
-              <a:rPr kumimoji="0" lang="en-AU" sz="2000" b="0" i="0" u="none" strike="noStrike" kern="0" cap="none" spc="0" normalizeH="0" baseline="0" noProof="0" dirty="0">
-                <a:ln>
-                  <a:noFill/>
-                </a:ln>
-                <a:solidFill>
-                  <a:schemeClr val="tx1"/>
-                </a:solidFill>
-                <a:effectLst/>
-                <a:uLnTx/>
-                <a:uFillTx/>
-              </a:rPr>
-              <a:t>A government issued disabled parking permit would be required</a:t>
-            </a:r>
-          </a:p>
-          <a:p>
-            <a:pPr marL="179388" lvl="0" indent="-179388">
-              <a:buFont typeface="Arial" pitchFamily="34" charset="0"/>
-              <a:buChar char="•"/>
-              <a:defRPr/>
-            </a:pPr>
-            <a:r>
-              <a:rPr lang="en-AU" sz="2000" kern="0" dirty="0">
-                <a:solidFill>
-                  <a:srgbClr val="FF0000"/>
-                </a:solidFill>
-              </a:rPr>
-              <a:t>As this policy is already enforced on campus, we intend to improve upon. New infraction types will be employed to allow for harsher punishments.</a:t>
-            </a:r>
-            <a:r>
-              <a:rPr lang="en-AU" sz="2000" kern="0" dirty="0">
-                <a:solidFill>
-                  <a:schemeClr val="tx1"/>
-                </a:solidFill>
-              </a:rPr>
-              <a:t> </a:t>
-            </a:r>
-            <a:endParaRPr kumimoji="0" lang="en-AU" sz="2000" b="0" i="0" u="none" strike="noStrike" kern="0" cap="none" spc="0" normalizeH="0" baseline="0" noProof="0" dirty="0">
-              <a:ln>
-                <a:noFill/>
-              </a:ln>
-              <a:solidFill>
-                <a:schemeClr val="tx1"/>
-              </a:solidFill>
-              <a:effectLst/>
-              <a:uLnTx/>
-              <a:uFillTx/>
-            </a:endParaRPr>
-          </a:p>
-        </p:txBody>
-      </p:sp>
-      <p:sp>
-        <p:nvSpPr>
-          <p:cNvPr id="9" name="Rectangle 8"/>
+          <p:cNvPr id="8" name="Rectangle 7"/>
           <p:cNvSpPr/>
           <p:nvPr/>
         </p:nvSpPr>
@@ -6054,20 +5452,1827 @@
           <a:p>
             <a:pPr algn="ctr"/>
             <a:r>
+              <a:rPr lang="en-AU" sz="2000" dirty="0" smtClean="0">
+                <a:solidFill>
+                  <a:schemeClr val="tx1"/>
+                </a:solidFill>
+              </a:rPr>
+              <a:t>SP</a:t>
+            </a:r>
+          </a:p>
+          <a:p>
+            <a:pPr algn="ctr"/>
+            <a:r>
+              <a:rPr lang="en-AU" sz="2000" dirty="0" smtClean="0">
+                <a:solidFill>
+                  <a:schemeClr val="tx1"/>
+                </a:solidFill>
+              </a:rPr>
+              <a:t>16</a:t>
+            </a:r>
+            <a:endParaRPr lang="en-AU" sz="2000" dirty="0">
+              <a:solidFill>
+                <a:schemeClr val="tx1"/>
+              </a:solidFill>
+            </a:endParaRPr>
+          </a:p>
+        </p:txBody>
+      </p:sp>
+      <p:sp>
+        <p:nvSpPr>
+          <p:cNvPr id="9" name="Rectangle 8"/>
+          <p:cNvSpPr/>
+          <p:nvPr/>
+        </p:nvSpPr>
+        <p:spPr>
+          <a:xfrm>
+            <a:off x="8283153" y="109410"/>
+            <a:ext cx="792000" cy="540000"/>
+          </a:xfrm>
+          <a:prstGeom prst="rect">
+            <a:avLst/>
+          </a:prstGeom>
+          <a:solidFill>
+            <a:schemeClr val="accent4">
+              <a:lumMod val="20000"/>
+              <a:lumOff val="80000"/>
+            </a:schemeClr>
+          </a:solidFill>
+          <a:ln>
+            <a:solidFill>
+              <a:schemeClr val="accent1">
+                <a:lumMod val="50000"/>
+              </a:schemeClr>
+            </a:solidFill>
+          </a:ln>
+        </p:spPr>
+        <p:style>
+          <a:lnRef idx="2">
+            <a:schemeClr val="accent1">
+              <a:shade val="50000"/>
+            </a:schemeClr>
+          </a:lnRef>
+          <a:fillRef idx="1">
+            <a:schemeClr val="accent1"/>
+          </a:fillRef>
+          <a:effectRef idx="0">
+            <a:schemeClr val="accent1"/>
+          </a:effectRef>
+          <a:fontRef idx="minor">
+            <a:schemeClr val="lt1"/>
+          </a:fontRef>
+        </p:style>
+        <p:txBody>
+          <a:bodyPr wrap="none" lIns="0" rIns="0" rtlCol="0" anchor="ctr"/>
+          <a:lstStyle/>
+          <a:p>
+            <a:pPr algn="ctr"/>
+            <a:r>
               <a:rPr lang="en-AU" sz="2000" dirty="0">
                 <a:solidFill>
                   <a:schemeClr val="tx1"/>
                 </a:solidFill>
               </a:rPr>
-              <a:t>Story Points</a:t>
-            </a:r>
+              <a:t>M</a:t>
+            </a:r>
+          </a:p>
+        </p:txBody>
+      </p:sp>
+      <p:sp>
+        <p:nvSpPr>
+          <p:cNvPr id="10" name="Rectangle 9"/>
+          <p:cNvSpPr/>
+          <p:nvPr/>
+        </p:nvSpPr>
+        <p:spPr>
+          <a:xfrm>
+            <a:off x="39153" y="5128590"/>
+            <a:ext cx="9828000" cy="1620000"/>
+          </a:xfrm>
+          <a:prstGeom prst="rect">
+            <a:avLst/>
+          </a:prstGeom>
+          <a:solidFill>
+            <a:schemeClr val="bg1"/>
+          </a:solidFill>
+          <a:ln>
+            <a:solidFill>
+              <a:schemeClr val="accent1">
+                <a:lumMod val="50000"/>
+              </a:schemeClr>
+            </a:solidFill>
+          </a:ln>
+        </p:spPr>
+        <p:style>
+          <a:lnRef idx="2">
+            <a:schemeClr val="accent1">
+              <a:shade val="50000"/>
+            </a:schemeClr>
+          </a:lnRef>
+          <a:fillRef idx="1">
+            <a:schemeClr val="accent1"/>
+          </a:fillRef>
+          <a:effectRef idx="0">
+            <a:schemeClr val="accent1"/>
+          </a:effectRef>
+          <a:fontRef idx="minor">
+            <a:schemeClr val="lt1"/>
+          </a:fontRef>
+        </p:style>
+        <p:txBody>
+          <a:bodyPr tIns="36000" rtlCol="0" anchor="t" anchorCtr="0"/>
+          <a:lstStyle/>
+          <a:p>
+            <a:r>
+              <a:rPr lang="en-AU" sz="2000" dirty="0">
+                <a:solidFill>
+                  <a:schemeClr val="tx1"/>
+                </a:solidFill>
+              </a:rPr>
+              <a:t>Notes</a:t>
+            </a:r>
+          </a:p>
+          <a:p>
+            <a:pPr marL="179388" indent="-179388">
+              <a:buFont typeface="Arial" pitchFamily="34" charset="0"/>
+              <a:buChar char="•"/>
+            </a:pPr>
+            <a:r>
+              <a:rPr lang="en-AU" sz="2000" dirty="0">
+                <a:solidFill>
+                  <a:schemeClr val="tx1"/>
+                </a:solidFill>
+              </a:rPr>
+              <a:t> </a:t>
+            </a:r>
+            <a:r>
+              <a:rPr lang="en-AU" sz="2000" dirty="0" smtClean="0">
+                <a:solidFill>
+                  <a:schemeClr val="tx1"/>
+                </a:solidFill>
+              </a:rPr>
+              <a:t>database may be encrypted or just kept on a secure network</a:t>
+            </a:r>
+            <a:endParaRPr lang="en-AU" sz="2000" dirty="0">
+              <a:solidFill>
+                <a:srgbClr val="FF0000"/>
+              </a:solidFill>
+            </a:endParaRPr>
           </a:p>
         </p:txBody>
       </p:sp>
     </p:spTree>
     <p:extLst>
       <p:ext uri="{BB962C8B-B14F-4D97-AF65-F5344CB8AC3E}">
-        <p14:creationId xmlns:p14="http://schemas.microsoft.com/office/powerpoint/2010/main" val="450741308"/>
+        <p14:creationId xmlns:p14="http://schemas.microsoft.com/office/powerpoint/2010/main" val="1370145931"/>
+      </p:ext>
+    </p:extLst>
+  </p:cSld>
+  <p:clrMapOvr>
+    <a:masterClrMapping/>
+  </p:clrMapOvr>
+  <p:timing>
+    <p:tnLst>
+      <p:par>
+        <p:cTn id="1" dur="indefinite" restart="never" nodeType="tmRoot"/>
+      </p:par>
+    </p:tnLst>
+  </p:timing>
+</p:sld>
+</file>
+
+<file path=ppt/slides/slide14.xml><?xml version="1.0" encoding="utf-8"?>
+<p:sld xmlns:a="http://schemas.openxmlformats.org/drawingml/2006/main" xmlns:r="http://schemas.openxmlformats.org/officeDocument/2006/relationships" xmlns:p="http://schemas.openxmlformats.org/presentationml/2006/main">
+  <p:cSld>
+    <p:spTree>
+      <p:nvGrpSpPr>
+        <p:cNvPr id="1" name=""/>
+        <p:cNvGrpSpPr/>
+        <p:nvPr/>
+      </p:nvGrpSpPr>
+      <p:grpSpPr>
+        <a:xfrm>
+          <a:off x="0" y="0"/>
+          <a:ext cx="0" cy="0"/>
+          <a:chOff x="0" y="0"/>
+          <a:chExt cx="0" cy="0"/>
+        </a:xfrm>
+      </p:grpSpPr>
+      <p:sp>
+        <p:nvSpPr>
+          <p:cNvPr id="4" name="Rectangle 3"/>
+          <p:cNvSpPr/>
+          <p:nvPr/>
+        </p:nvSpPr>
+        <p:spPr>
+          <a:xfrm>
+            <a:off x="39153" y="109410"/>
+            <a:ext cx="720000" cy="540000"/>
+          </a:xfrm>
+          <a:prstGeom prst="rect">
+            <a:avLst/>
+          </a:prstGeom>
+          <a:solidFill>
+            <a:schemeClr val="accent1">
+              <a:lumMod val="40000"/>
+              <a:lumOff val="60000"/>
+            </a:schemeClr>
+          </a:solidFill>
+          <a:ln>
+            <a:solidFill>
+              <a:schemeClr val="accent1">
+                <a:lumMod val="50000"/>
+              </a:schemeClr>
+            </a:solidFill>
+          </a:ln>
+        </p:spPr>
+        <p:style>
+          <a:lnRef idx="2">
+            <a:schemeClr val="accent1">
+              <a:shade val="50000"/>
+            </a:schemeClr>
+          </a:lnRef>
+          <a:fillRef idx="1">
+            <a:schemeClr val="accent1"/>
+          </a:fillRef>
+          <a:effectRef idx="0">
+            <a:schemeClr val="accent1"/>
+          </a:effectRef>
+          <a:fontRef idx="minor">
+            <a:schemeClr val="lt1"/>
+          </a:fontRef>
+        </p:style>
+        <p:txBody>
+          <a:bodyPr wrap="square" lIns="0" rIns="0" rtlCol="0" anchor="ctr"/>
+          <a:lstStyle/>
+          <a:p>
+            <a:pPr algn="ctr"/>
+            <a:r>
+              <a:rPr lang="en-AU" sz="2000" dirty="0">
+                <a:solidFill>
+                  <a:schemeClr val="tx1"/>
+                </a:solidFill>
+              </a:rPr>
+              <a:t>Story </a:t>
+            </a:r>
+            <a:r>
+              <a:rPr lang="en-AU" sz="2000" dirty="0" smtClean="0">
+                <a:solidFill>
+                  <a:schemeClr val="tx1"/>
+                </a:solidFill>
+              </a:rPr>
+              <a:t>13</a:t>
+            </a:r>
+            <a:endParaRPr lang="en-AU" sz="2000" dirty="0">
+              <a:solidFill>
+                <a:schemeClr val="tx1"/>
+              </a:solidFill>
+            </a:endParaRPr>
+          </a:p>
+        </p:txBody>
+      </p:sp>
+      <p:sp>
+        <p:nvSpPr>
+          <p:cNvPr id="5" name="Rectangle 4"/>
+          <p:cNvSpPr/>
+          <p:nvPr/>
+        </p:nvSpPr>
+        <p:spPr>
+          <a:xfrm>
+            <a:off x="831153" y="109410"/>
+            <a:ext cx="7380000" cy="540000"/>
+          </a:xfrm>
+          <a:prstGeom prst="rect">
+            <a:avLst/>
+          </a:prstGeom>
+          <a:ln>
+            <a:solidFill>
+              <a:schemeClr val="accent1">
+                <a:lumMod val="50000"/>
+              </a:schemeClr>
+            </a:solidFill>
+          </a:ln>
+        </p:spPr>
+        <p:style>
+          <a:lnRef idx="2">
+            <a:schemeClr val="accent1">
+              <a:shade val="50000"/>
+            </a:schemeClr>
+          </a:lnRef>
+          <a:fillRef idx="1">
+            <a:schemeClr val="accent1"/>
+          </a:fillRef>
+          <a:effectRef idx="0">
+            <a:schemeClr val="accent1"/>
+          </a:effectRef>
+          <a:fontRef idx="minor">
+            <a:schemeClr val="lt1"/>
+          </a:fontRef>
+        </p:style>
+        <p:txBody>
+          <a:bodyPr rtlCol="0" anchor="ctr"/>
+          <a:lstStyle/>
+          <a:p>
+            <a:pPr algn="ctr"/>
+            <a:r>
+              <a:rPr lang="en-AU" sz="2800" dirty="0" smtClean="0"/>
+              <a:t>Accessible and secure </a:t>
+            </a:r>
+            <a:r>
+              <a:rPr lang="en-AU" sz="2800" dirty="0" smtClean="0"/>
+              <a:t>health violations</a:t>
+            </a:r>
+            <a:endParaRPr lang="en-AU" sz="2800" dirty="0"/>
+          </a:p>
+        </p:txBody>
+      </p:sp>
+      <p:sp>
+        <p:nvSpPr>
+          <p:cNvPr id="6" name="Rectangle 5"/>
+          <p:cNvSpPr/>
+          <p:nvPr/>
+        </p:nvSpPr>
+        <p:spPr>
+          <a:xfrm>
+            <a:off x="39153" y="822470"/>
+            <a:ext cx="9828000" cy="2340000"/>
+          </a:xfrm>
+          <a:prstGeom prst="rect">
+            <a:avLst/>
+          </a:prstGeom>
+          <a:solidFill>
+            <a:schemeClr val="tx2">
+              <a:lumMod val="20000"/>
+              <a:lumOff val="80000"/>
+            </a:schemeClr>
+          </a:solidFill>
+          <a:ln>
+            <a:solidFill>
+              <a:schemeClr val="accent1">
+                <a:lumMod val="50000"/>
+              </a:schemeClr>
+            </a:solidFill>
+          </a:ln>
+        </p:spPr>
+        <p:style>
+          <a:lnRef idx="2">
+            <a:schemeClr val="accent1">
+              <a:shade val="50000"/>
+            </a:schemeClr>
+          </a:lnRef>
+          <a:fillRef idx="1">
+            <a:schemeClr val="accent1"/>
+          </a:fillRef>
+          <a:effectRef idx="0">
+            <a:schemeClr val="accent1"/>
+          </a:effectRef>
+          <a:fontRef idx="minor">
+            <a:schemeClr val="lt1"/>
+          </a:fontRef>
+        </p:style>
+        <p:txBody>
+          <a:bodyPr rtlCol="0" anchor="t" anchorCtr="0"/>
+          <a:lstStyle/>
+          <a:p>
+            <a:r>
+              <a:rPr lang="en-AU" sz="2400" dirty="0">
+                <a:solidFill>
+                  <a:schemeClr val="tx1"/>
+                </a:solidFill>
+              </a:rPr>
+              <a:t>As </a:t>
+            </a:r>
+            <a:r>
+              <a:rPr lang="en-AU" sz="2400" dirty="0" smtClean="0">
+                <a:solidFill>
+                  <a:schemeClr val="tx1"/>
+                </a:solidFill>
+              </a:rPr>
+              <a:t>a member of </a:t>
+            </a:r>
+            <a:r>
+              <a:rPr lang="en-AU" sz="2400" dirty="0" smtClean="0">
+                <a:solidFill>
+                  <a:schemeClr val="tx1"/>
+                </a:solidFill>
+              </a:rPr>
+              <a:t>a departments staff, </a:t>
+            </a:r>
+            <a:r>
+              <a:rPr lang="en-AU" sz="2400" dirty="0" smtClean="0">
+                <a:solidFill>
+                  <a:schemeClr val="tx1"/>
+                </a:solidFill>
+              </a:rPr>
+              <a:t>I want health violation reports to be stored securel</a:t>
+            </a:r>
+            <a:r>
+              <a:rPr lang="en-AU" sz="2400" dirty="0" smtClean="0">
+                <a:solidFill>
+                  <a:schemeClr val="tx1"/>
+                </a:solidFill>
+              </a:rPr>
+              <a:t>y so that the reports will not be lost either accidently or from outside attacks.</a:t>
+            </a:r>
+            <a:endParaRPr lang="en-AU" sz="2400" dirty="0">
+              <a:solidFill>
+                <a:schemeClr val="tx1"/>
+              </a:solidFill>
+            </a:endParaRPr>
+          </a:p>
+        </p:txBody>
+      </p:sp>
+      <p:sp>
+        <p:nvSpPr>
+          <p:cNvPr id="7" name="Rectangle 6"/>
+          <p:cNvSpPr/>
+          <p:nvPr/>
+        </p:nvSpPr>
+        <p:spPr>
+          <a:xfrm>
+            <a:off x="39153" y="3335530"/>
+            <a:ext cx="9828000" cy="1620000"/>
+          </a:xfrm>
+          <a:prstGeom prst="rect">
+            <a:avLst/>
+          </a:prstGeom>
+          <a:solidFill>
+            <a:schemeClr val="accent1">
+              <a:lumMod val="20000"/>
+              <a:lumOff val="80000"/>
+            </a:schemeClr>
+          </a:solidFill>
+          <a:ln>
+            <a:solidFill>
+              <a:schemeClr val="accent1">
+                <a:lumMod val="50000"/>
+              </a:schemeClr>
+            </a:solidFill>
+          </a:ln>
+        </p:spPr>
+        <p:style>
+          <a:lnRef idx="2">
+            <a:schemeClr val="accent1">
+              <a:shade val="50000"/>
+            </a:schemeClr>
+          </a:lnRef>
+          <a:fillRef idx="1">
+            <a:schemeClr val="accent1"/>
+          </a:fillRef>
+          <a:effectRef idx="0">
+            <a:schemeClr val="accent1"/>
+          </a:effectRef>
+          <a:fontRef idx="minor">
+            <a:schemeClr val="lt1"/>
+          </a:fontRef>
+        </p:style>
+        <p:txBody>
+          <a:bodyPr tIns="36000" rtlCol="0" anchor="t" anchorCtr="0"/>
+          <a:lstStyle/>
+          <a:p>
+            <a:r>
+              <a:rPr lang="en-AU" sz="2000" dirty="0">
+                <a:solidFill>
+                  <a:schemeClr val="tx1"/>
+                </a:solidFill>
+              </a:rPr>
+              <a:t>Acceptance Criteria</a:t>
+            </a:r>
+          </a:p>
+          <a:p>
+            <a:pPr marL="179388" indent="-179388">
+              <a:buFont typeface="Arial" pitchFamily="34" charset="0"/>
+              <a:buChar char="•"/>
+            </a:pPr>
+            <a:r>
+              <a:rPr lang="en-AU" sz="2000" dirty="0" smtClean="0">
+                <a:solidFill>
+                  <a:schemeClr val="tx1"/>
+                </a:solidFill>
+              </a:rPr>
+              <a:t>Secure database to prevent any malicious attacks with encryption and secure network</a:t>
+            </a:r>
+            <a:endParaRPr lang="en-AU" sz="2000" dirty="0">
+              <a:solidFill>
+                <a:schemeClr val="tx1"/>
+              </a:solidFill>
+            </a:endParaRPr>
+          </a:p>
+        </p:txBody>
+      </p:sp>
+      <p:sp>
+        <p:nvSpPr>
+          <p:cNvPr id="8" name="Rectangle 7"/>
+          <p:cNvSpPr/>
+          <p:nvPr/>
+        </p:nvSpPr>
+        <p:spPr>
+          <a:xfrm>
+            <a:off x="9147153" y="109410"/>
+            <a:ext cx="720000" cy="540000"/>
+          </a:xfrm>
+          <a:prstGeom prst="rect">
+            <a:avLst/>
+          </a:prstGeom>
+          <a:solidFill>
+            <a:srgbClr val="CCF0CD">
+              <a:alpha val="20000"/>
+            </a:srgbClr>
+          </a:solidFill>
+          <a:ln>
+            <a:solidFill>
+              <a:schemeClr val="accent1">
+                <a:lumMod val="50000"/>
+              </a:schemeClr>
+            </a:solidFill>
+          </a:ln>
+        </p:spPr>
+        <p:style>
+          <a:lnRef idx="2">
+            <a:schemeClr val="accent1">
+              <a:shade val="50000"/>
+            </a:schemeClr>
+          </a:lnRef>
+          <a:fillRef idx="1">
+            <a:schemeClr val="accent1"/>
+          </a:fillRef>
+          <a:effectRef idx="0">
+            <a:schemeClr val="accent1"/>
+          </a:effectRef>
+          <a:fontRef idx="minor">
+            <a:schemeClr val="lt1"/>
+          </a:fontRef>
+        </p:style>
+        <p:txBody>
+          <a:bodyPr wrap="square" lIns="0" rIns="0" rtlCol="0" anchor="ctr"/>
+          <a:lstStyle/>
+          <a:p>
+            <a:pPr algn="ctr"/>
+            <a:r>
+              <a:rPr lang="en-AU" sz="2000" dirty="0" smtClean="0">
+                <a:solidFill>
+                  <a:schemeClr val="tx1"/>
+                </a:solidFill>
+              </a:rPr>
+              <a:t>SP</a:t>
+            </a:r>
+          </a:p>
+          <a:p>
+            <a:pPr algn="ctr"/>
+            <a:r>
+              <a:rPr lang="en-AU" sz="2000" dirty="0" smtClean="0">
+                <a:solidFill>
+                  <a:schemeClr val="tx1"/>
+                </a:solidFill>
+              </a:rPr>
+              <a:t>16</a:t>
+            </a:r>
+            <a:endParaRPr lang="en-AU" sz="2000" dirty="0">
+              <a:solidFill>
+                <a:schemeClr val="tx1"/>
+              </a:solidFill>
+            </a:endParaRPr>
+          </a:p>
+        </p:txBody>
+      </p:sp>
+      <p:sp>
+        <p:nvSpPr>
+          <p:cNvPr id="9" name="Rectangle 8"/>
+          <p:cNvSpPr/>
+          <p:nvPr/>
+        </p:nvSpPr>
+        <p:spPr>
+          <a:xfrm>
+            <a:off x="8283153" y="109410"/>
+            <a:ext cx="792000" cy="540000"/>
+          </a:xfrm>
+          <a:prstGeom prst="rect">
+            <a:avLst/>
+          </a:prstGeom>
+          <a:solidFill>
+            <a:schemeClr val="accent4">
+              <a:lumMod val="20000"/>
+              <a:lumOff val="80000"/>
+            </a:schemeClr>
+          </a:solidFill>
+          <a:ln>
+            <a:solidFill>
+              <a:schemeClr val="accent1">
+                <a:lumMod val="50000"/>
+              </a:schemeClr>
+            </a:solidFill>
+          </a:ln>
+        </p:spPr>
+        <p:style>
+          <a:lnRef idx="2">
+            <a:schemeClr val="accent1">
+              <a:shade val="50000"/>
+            </a:schemeClr>
+          </a:lnRef>
+          <a:fillRef idx="1">
+            <a:schemeClr val="accent1"/>
+          </a:fillRef>
+          <a:effectRef idx="0">
+            <a:schemeClr val="accent1"/>
+          </a:effectRef>
+          <a:fontRef idx="minor">
+            <a:schemeClr val="lt1"/>
+          </a:fontRef>
+        </p:style>
+        <p:txBody>
+          <a:bodyPr wrap="none" lIns="0" rIns="0" rtlCol="0" anchor="ctr"/>
+          <a:lstStyle/>
+          <a:p>
+            <a:pPr algn="ctr"/>
+            <a:r>
+              <a:rPr lang="en-AU" sz="2000" dirty="0" smtClean="0">
+                <a:solidFill>
+                  <a:schemeClr val="tx1"/>
+                </a:solidFill>
+              </a:rPr>
+              <a:t>M</a:t>
+            </a:r>
+            <a:endParaRPr lang="en-AU" sz="2000" dirty="0">
+              <a:solidFill>
+                <a:schemeClr val="tx1"/>
+              </a:solidFill>
+            </a:endParaRPr>
+          </a:p>
+        </p:txBody>
+      </p:sp>
+      <p:sp>
+        <p:nvSpPr>
+          <p:cNvPr id="10" name="Rectangle 9"/>
+          <p:cNvSpPr/>
+          <p:nvPr/>
+        </p:nvSpPr>
+        <p:spPr>
+          <a:xfrm>
+            <a:off x="39153" y="5128590"/>
+            <a:ext cx="9828000" cy="1620000"/>
+          </a:xfrm>
+          <a:prstGeom prst="rect">
+            <a:avLst/>
+          </a:prstGeom>
+          <a:solidFill>
+            <a:schemeClr val="bg1"/>
+          </a:solidFill>
+          <a:ln>
+            <a:solidFill>
+              <a:schemeClr val="accent1">
+                <a:lumMod val="50000"/>
+              </a:schemeClr>
+            </a:solidFill>
+          </a:ln>
+        </p:spPr>
+        <p:style>
+          <a:lnRef idx="2">
+            <a:schemeClr val="accent1">
+              <a:shade val="50000"/>
+            </a:schemeClr>
+          </a:lnRef>
+          <a:fillRef idx="1">
+            <a:schemeClr val="accent1"/>
+          </a:fillRef>
+          <a:effectRef idx="0">
+            <a:schemeClr val="accent1"/>
+          </a:effectRef>
+          <a:fontRef idx="minor">
+            <a:schemeClr val="lt1"/>
+          </a:fontRef>
+        </p:style>
+        <p:txBody>
+          <a:bodyPr tIns="36000" rtlCol="0" anchor="t" anchorCtr="0"/>
+          <a:lstStyle/>
+          <a:p>
+            <a:r>
+              <a:rPr lang="en-AU" sz="2000" dirty="0">
+                <a:solidFill>
+                  <a:schemeClr val="tx1"/>
+                </a:solidFill>
+              </a:rPr>
+              <a:t>Notes</a:t>
+            </a:r>
+          </a:p>
+          <a:p>
+            <a:endParaRPr lang="en-AU" sz="2000" dirty="0">
+              <a:solidFill>
+                <a:srgbClr val="FF0000"/>
+              </a:solidFill>
+            </a:endParaRPr>
+          </a:p>
+        </p:txBody>
+      </p:sp>
+    </p:spTree>
+    <p:extLst>
+      <p:ext uri="{BB962C8B-B14F-4D97-AF65-F5344CB8AC3E}">
+        <p14:creationId xmlns:p14="http://schemas.microsoft.com/office/powerpoint/2010/main" val="3894759646"/>
+      </p:ext>
+    </p:extLst>
+  </p:cSld>
+  <p:clrMapOvr>
+    <a:masterClrMapping/>
+  </p:clrMapOvr>
+  <p:timing>
+    <p:tnLst>
+      <p:par>
+        <p:cTn id="1" dur="indefinite" restart="never" nodeType="tmRoot"/>
+      </p:par>
+    </p:tnLst>
+  </p:timing>
+</p:sld>
+</file>
+
+<file path=ppt/slides/slide15.xml><?xml version="1.0" encoding="utf-8"?>
+<p:sld xmlns:a="http://schemas.openxmlformats.org/drawingml/2006/main" xmlns:r="http://schemas.openxmlformats.org/officeDocument/2006/relationships" xmlns:p="http://schemas.openxmlformats.org/presentationml/2006/main">
+  <p:cSld>
+    <p:spTree>
+      <p:nvGrpSpPr>
+        <p:cNvPr id="1" name=""/>
+        <p:cNvGrpSpPr/>
+        <p:nvPr/>
+      </p:nvGrpSpPr>
+      <p:grpSpPr>
+        <a:xfrm>
+          <a:off x="0" y="0"/>
+          <a:ext cx="0" cy="0"/>
+          <a:chOff x="0" y="0"/>
+          <a:chExt cx="0" cy="0"/>
+        </a:xfrm>
+      </p:grpSpPr>
+      <p:sp>
+        <p:nvSpPr>
+          <p:cNvPr id="4" name="Rectangle 3"/>
+          <p:cNvSpPr/>
+          <p:nvPr/>
+        </p:nvSpPr>
+        <p:spPr>
+          <a:xfrm>
+            <a:off x="39153" y="109410"/>
+            <a:ext cx="720000" cy="540000"/>
+          </a:xfrm>
+          <a:prstGeom prst="rect">
+            <a:avLst/>
+          </a:prstGeom>
+          <a:solidFill>
+            <a:schemeClr val="accent1">
+              <a:lumMod val="40000"/>
+              <a:lumOff val="60000"/>
+            </a:schemeClr>
+          </a:solidFill>
+          <a:ln>
+            <a:solidFill>
+              <a:schemeClr val="accent1">
+                <a:lumMod val="50000"/>
+              </a:schemeClr>
+            </a:solidFill>
+          </a:ln>
+        </p:spPr>
+        <p:style>
+          <a:lnRef idx="2">
+            <a:schemeClr val="accent1">
+              <a:shade val="50000"/>
+            </a:schemeClr>
+          </a:lnRef>
+          <a:fillRef idx="1">
+            <a:schemeClr val="accent1"/>
+          </a:fillRef>
+          <a:effectRef idx="0">
+            <a:schemeClr val="accent1"/>
+          </a:effectRef>
+          <a:fontRef idx="minor">
+            <a:schemeClr val="lt1"/>
+          </a:fontRef>
+        </p:style>
+        <p:txBody>
+          <a:bodyPr wrap="square" lIns="0" rIns="0" rtlCol="0" anchor="ctr"/>
+          <a:lstStyle/>
+          <a:p>
+            <a:pPr algn="ctr"/>
+            <a:r>
+              <a:rPr lang="en-AU" sz="2000" dirty="0">
+                <a:solidFill>
+                  <a:schemeClr val="tx1"/>
+                </a:solidFill>
+              </a:rPr>
+              <a:t>Story </a:t>
+            </a:r>
+            <a:r>
+              <a:rPr lang="en-AU" sz="2000" dirty="0" smtClean="0">
+                <a:solidFill>
+                  <a:schemeClr val="tx1"/>
+                </a:solidFill>
+              </a:rPr>
+              <a:t>14</a:t>
+            </a:r>
+            <a:endParaRPr lang="en-AU" sz="2000" dirty="0">
+              <a:solidFill>
+                <a:schemeClr val="tx1"/>
+              </a:solidFill>
+            </a:endParaRPr>
+          </a:p>
+        </p:txBody>
+      </p:sp>
+      <p:sp>
+        <p:nvSpPr>
+          <p:cNvPr id="5" name="Rectangle 4"/>
+          <p:cNvSpPr/>
+          <p:nvPr/>
+        </p:nvSpPr>
+        <p:spPr>
+          <a:xfrm>
+            <a:off x="831153" y="109410"/>
+            <a:ext cx="7380000" cy="540000"/>
+          </a:xfrm>
+          <a:prstGeom prst="rect">
+            <a:avLst/>
+          </a:prstGeom>
+          <a:ln>
+            <a:solidFill>
+              <a:schemeClr val="accent1">
+                <a:lumMod val="50000"/>
+              </a:schemeClr>
+            </a:solidFill>
+          </a:ln>
+        </p:spPr>
+        <p:style>
+          <a:lnRef idx="2">
+            <a:schemeClr val="accent1">
+              <a:shade val="50000"/>
+            </a:schemeClr>
+          </a:lnRef>
+          <a:fillRef idx="1">
+            <a:schemeClr val="accent1"/>
+          </a:fillRef>
+          <a:effectRef idx="0">
+            <a:schemeClr val="accent1"/>
+          </a:effectRef>
+          <a:fontRef idx="minor">
+            <a:schemeClr val="lt1"/>
+          </a:fontRef>
+        </p:style>
+        <p:txBody>
+          <a:bodyPr rtlCol="0" anchor="ctr"/>
+          <a:lstStyle/>
+          <a:p>
+            <a:pPr algn="ctr"/>
+            <a:r>
+              <a:rPr lang="en-AU" sz="2800" dirty="0" smtClean="0"/>
+              <a:t>Useability and scalability</a:t>
+            </a:r>
+            <a:endParaRPr lang="en-AU" sz="2800" dirty="0"/>
+          </a:p>
+        </p:txBody>
+      </p:sp>
+      <p:sp>
+        <p:nvSpPr>
+          <p:cNvPr id="6" name="Rectangle 5"/>
+          <p:cNvSpPr/>
+          <p:nvPr/>
+        </p:nvSpPr>
+        <p:spPr>
+          <a:xfrm>
+            <a:off x="39153" y="822470"/>
+            <a:ext cx="9828000" cy="2340000"/>
+          </a:xfrm>
+          <a:prstGeom prst="rect">
+            <a:avLst/>
+          </a:prstGeom>
+          <a:solidFill>
+            <a:schemeClr val="tx2">
+              <a:lumMod val="20000"/>
+              <a:lumOff val="80000"/>
+            </a:schemeClr>
+          </a:solidFill>
+          <a:ln>
+            <a:solidFill>
+              <a:schemeClr val="accent1">
+                <a:lumMod val="50000"/>
+              </a:schemeClr>
+            </a:solidFill>
+          </a:ln>
+        </p:spPr>
+        <p:style>
+          <a:lnRef idx="2">
+            <a:schemeClr val="accent1">
+              <a:shade val="50000"/>
+            </a:schemeClr>
+          </a:lnRef>
+          <a:fillRef idx="1">
+            <a:schemeClr val="accent1"/>
+          </a:fillRef>
+          <a:effectRef idx="0">
+            <a:schemeClr val="accent1"/>
+          </a:effectRef>
+          <a:fontRef idx="minor">
+            <a:schemeClr val="lt1"/>
+          </a:fontRef>
+        </p:style>
+        <p:txBody>
+          <a:bodyPr rtlCol="0" anchor="t" anchorCtr="0"/>
+          <a:lstStyle/>
+          <a:p>
+            <a:r>
+              <a:rPr lang="en-AU" sz="2400" dirty="0">
+                <a:solidFill>
+                  <a:schemeClr val="tx1"/>
+                </a:solidFill>
+              </a:rPr>
+              <a:t>As </a:t>
+            </a:r>
+            <a:r>
+              <a:rPr lang="en-AU" sz="2400" dirty="0" smtClean="0">
+                <a:solidFill>
+                  <a:schemeClr val="tx1"/>
+                </a:solidFill>
+              </a:rPr>
+              <a:t>a staff member, student or visitor, I want the parking permit and health violation webpage to be fast and responsive so I can submit the forms as quickly as possible</a:t>
+            </a:r>
+            <a:r>
+              <a:rPr lang="en-AU" sz="2400" dirty="0" smtClean="0">
+                <a:solidFill>
+                  <a:schemeClr val="tx1"/>
+                </a:solidFill>
+              </a:rPr>
+              <a:t>.</a:t>
+            </a:r>
+            <a:endParaRPr lang="en-AU" sz="2400" dirty="0">
+              <a:solidFill>
+                <a:schemeClr val="tx1"/>
+              </a:solidFill>
+            </a:endParaRPr>
+          </a:p>
+        </p:txBody>
+      </p:sp>
+      <p:sp>
+        <p:nvSpPr>
+          <p:cNvPr id="7" name="Rectangle 6"/>
+          <p:cNvSpPr/>
+          <p:nvPr/>
+        </p:nvSpPr>
+        <p:spPr>
+          <a:xfrm>
+            <a:off x="39153" y="3335530"/>
+            <a:ext cx="9828000" cy="1620000"/>
+          </a:xfrm>
+          <a:prstGeom prst="rect">
+            <a:avLst/>
+          </a:prstGeom>
+          <a:solidFill>
+            <a:schemeClr val="accent1">
+              <a:lumMod val="20000"/>
+              <a:lumOff val="80000"/>
+            </a:schemeClr>
+          </a:solidFill>
+          <a:ln>
+            <a:solidFill>
+              <a:schemeClr val="accent1">
+                <a:lumMod val="50000"/>
+              </a:schemeClr>
+            </a:solidFill>
+          </a:ln>
+        </p:spPr>
+        <p:style>
+          <a:lnRef idx="2">
+            <a:schemeClr val="accent1">
+              <a:shade val="50000"/>
+            </a:schemeClr>
+          </a:lnRef>
+          <a:fillRef idx="1">
+            <a:schemeClr val="accent1"/>
+          </a:fillRef>
+          <a:effectRef idx="0">
+            <a:schemeClr val="accent1"/>
+          </a:effectRef>
+          <a:fontRef idx="minor">
+            <a:schemeClr val="lt1"/>
+          </a:fontRef>
+        </p:style>
+        <p:txBody>
+          <a:bodyPr tIns="36000" rtlCol="0" anchor="t" anchorCtr="0"/>
+          <a:lstStyle/>
+          <a:p>
+            <a:r>
+              <a:rPr lang="en-AU" sz="2000" dirty="0">
+                <a:solidFill>
+                  <a:schemeClr val="tx1"/>
+                </a:solidFill>
+              </a:rPr>
+              <a:t>Acceptance Criteria</a:t>
+            </a:r>
+          </a:p>
+          <a:p>
+            <a:pPr marL="179388" indent="-179388">
+              <a:buFont typeface="Arial" pitchFamily="34" charset="0"/>
+              <a:buChar char="•"/>
+            </a:pPr>
+            <a:r>
+              <a:rPr lang="en-AU" sz="2000" dirty="0" smtClean="0">
+                <a:solidFill>
+                  <a:schemeClr val="tx1"/>
+                </a:solidFill>
+              </a:rPr>
+              <a:t>System must be able to preform well under moderate load</a:t>
+            </a:r>
+          </a:p>
+          <a:p>
+            <a:pPr marL="179388" indent="-179388">
+              <a:buFont typeface="Arial" pitchFamily="34" charset="0"/>
+              <a:buChar char="•"/>
+            </a:pPr>
+            <a:r>
+              <a:rPr lang="en-AU" sz="2000" dirty="0" smtClean="0">
+                <a:solidFill>
+                  <a:schemeClr val="tx1"/>
+                </a:solidFill>
+              </a:rPr>
+              <a:t>With 500 users the website should take no longer then two seconds to submit forms or retrieve pages.</a:t>
+            </a:r>
+            <a:endParaRPr lang="en-AU" sz="2000" dirty="0">
+              <a:solidFill>
+                <a:schemeClr val="tx1"/>
+              </a:solidFill>
+            </a:endParaRPr>
+          </a:p>
+        </p:txBody>
+      </p:sp>
+      <p:sp>
+        <p:nvSpPr>
+          <p:cNvPr id="8" name="Rectangle 7"/>
+          <p:cNvSpPr/>
+          <p:nvPr/>
+        </p:nvSpPr>
+        <p:spPr>
+          <a:xfrm>
+            <a:off x="9147153" y="109410"/>
+            <a:ext cx="720000" cy="540000"/>
+          </a:xfrm>
+          <a:prstGeom prst="rect">
+            <a:avLst/>
+          </a:prstGeom>
+          <a:solidFill>
+            <a:srgbClr val="CCF0CD">
+              <a:alpha val="20000"/>
+            </a:srgbClr>
+          </a:solidFill>
+          <a:ln>
+            <a:solidFill>
+              <a:schemeClr val="accent1">
+                <a:lumMod val="50000"/>
+              </a:schemeClr>
+            </a:solidFill>
+          </a:ln>
+        </p:spPr>
+        <p:style>
+          <a:lnRef idx="2">
+            <a:schemeClr val="accent1">
+              <a:shade val="50000"/>
+            </a:schemeClr>
+          </a:lnRef>
+          <a:fillRef idx="1">
+            <a:schemeClr val="accent1"/>
+          </a:fillRef>
+          <a:effectRef idx="0">
+            <a:schemeClr val="accent1"/>
+          </a:effectRef>
+          <a:fontRef idx="minor">
+            <a:schemeClr val="lt1"/>
+          </a:fontRef>
+        </p:style>
+        <p:txBody>
+          <a:bodyPr wrap="square" lIns="0" rIns="0" rtlCol="0" anchor="ctr"/>
+          <a:lstStyle/>
+          <a:p>
+            <a:pPr algn="ctr"/>
+            <a:r>
+              <a:rPr lang="en-AU" sz="2000" dirty="0" smtClean="0">
+                <a:solidFill>
+                  <a:schemeClr val="tx1"/>
+                </a:solidFill>
+              </a:rPr>
+              <a:t>SP</a:t>
+            </a:r>
+          </a:p>
+          <a:p>
+            <a:pPr algn="ctr"/>
+            <a:r>
+              <a:rPr lang="en-AU" sz="2000" dirty="0">
+                <a:solidFill>
+                  <a:schemeClr val="tx1"/>
+                </a:solidFill>
+              </a:rPr>
+              <a:t>4</a:t>
+            </a:r>
+            <a:endParaRPr lang="en-AU" sz="2000" dirty="0">
+              <a:solidFill>
+                <a:schemeClr val="tx1"/>
+              </a:solidFill>
+            </a:endParaRPr>
+          </a:p>
+        </p:txBody>
+      </p:sp>
+      <p:sp>
+        <p:nvSpPr>
+          <p:cNvPr id="9" name="Rectangle 8"/>
+          <p:cNvSpPr/>
+          <p:nvPr/>
+        </p:nvSpPr>
+        <p:spPr>
+          <a:xfrm>
+            <a:off x="8283153" y="109410"/>
+            <a:ext cx="792000" cy="540000"/>
+          </a:xfrm>
+          <a:prstGeom prst="rect">
+            <a:avLst/>
+          </a:prstGeom>
+          <a:solidFill>
+            <a:schemeClr val="accent4">
+              <a:lumMod val="20000"/>
+              <a:lumOff val="80000"/>
+            </a:schemeClr>
+          </a:solidFill>
+          <a:ln>
+            <a:solidFill>
+              <a:schemeClr val="accent1">
+                <a:lumMod val="50000"/>
+              </a:schemeClr>
+            </a:solidFill>
+          </a:ln>
+        </p:spPr>
+        <p:style>
+          <a:lnRef idx="2">
+            <a:schemeClr val="accent1">
+              <a:shade val="50000"/>
+            </a:schemeClr>
+          </a:lnRef>
+          <a:fillRef idx="1">
+            <a:schemeClr val="accent1"/>
+          </a:fillRef>
+          <a:effectRef idx="0">
+            <a:schemeClr val="accent1"/>
+          </a:effectRef>
+          <a:fontRef idx="minor">
+            <a:schemeClr val="lt1"/>
+          </a:fontRef>
+        </p:style>
+        <p:txBody>
+          <a:bodyPr wrap="none" lIns="0" rIns="0" rtlCol="0" anchor="ctr"/>
+          <a:lstStyle/>
+          <a:p>
+            <a:pPr algn="ctr"/>
+            <a:r>
+              <a:rPr lang="en-AU" sz="2000" dirty="0" smtClean="0">
+                <a:solidFill>
+                  <a:schemeClr val="tx1"/>
+                </a:solidFill>
+              </a:rPr>
+              <a:t>S</a:t>
+            </a:r>
+            <a:endParaRPr lang="en-AU" sz="2000" dirty="0">
+              <a:solidFill>
+                <a:schemeClr val="tx1"/>
+              </a:solidFill>
+            </a:endParaRPr>
+          </a:p>
+        </p:txBody>
+      </p:sp>
+      <p:sp>
+        <p:nvSpPr>
+          <p:cNvPr id="10" name="Rectangle 9"/>
+          <p:cNvSpPr/>
+          <p:nvPr/>
+        </p:nvSpPr>
+        <p:spPr>
+          <a:xfrm>
+            <a:off x="39153" y="5128590"/>
+            <a:ext cx="9828000" cy="1620000"/>
+          </a:xfrm>
+          <a:prstGeom prst="rect">
+            <a:avLst/>
+          </a:prstGeom>
+          <a:solidFill>
+            <a:schemeClr val="bg1"/>
+          </a:solidFill>
+          <a:ln>
+            <a:solidFill>
+              <a:schemeClr val="accent1">
+                <a:lumMod val="50000"/>
+              </a:schemeClr>
+            </a:solidFill>
+          </a:ln>
+        </p:spPr>
+        <p:style>
+          <a:lnRef idx="2">
+            <a:schemeClr val="accent1">
+              <a:shade val="50000"/>
+            </a:schemeClr>
+          </a:lnRef>
+          <a:fillRef idx="1">
+            <a:schemeClr val="accent1"/>
+          </a:fillRef>
+          <a:effectRef idx="0">
+            <a:schemeClr val="accent1"/>
+          </a:effectRef>
+          <a:fontRef idx="minor">
+            <a:schemeClr val="lt1"/>
+          </a:fontRef>
+        </p:style>
+        <p:txBody>
+          <a:bodyPr tIns="36000" rtlCol="0" anchor="t" anchorCtr="0"/>
+          <a:lstStyle/>
+          <a:p>
+            <a:r>
+              <a:rPr lang="en-AU" sz="2000" dirty="0">
+                <a:solidFill>
+                  <a:schemeClr val="tx1"/>
+                </a:solidFill>
+              </a:rPr>
+              <a:t>Notes</a:t>
+            </a:r>
+          </a:p>
+          <a:p>
+            <a:endParaRPr lang="en-AU" sz="2000" dirty="0">
+              <a:solidFill>
+                <a:srgbClr val="FF0000"/>
+              </a:solidFill>
+            </a:endParaRPr>
+          </a:p>
+        </p:txBody>
+      </p:sp>
+    </p:spTree>
+    <p:extLst>
+      <p:ext uri="{BB962C8B-B14F-4D97-AF65-F5344CB8AC3E}">
+        <p14:creationId xmlns:p14="http://schemas.microsoft.com/office/powerpoint/2010/main" val="3865240964"/>
+      </p:ext>
+    </p:extLst>
+  </p:cSld>
+  <p:clrMapOvr>
+    <a:masterClrMapping/>
+  </p:clrMapOvr>
+  <p:timing>
+    <p:tnLst>
+      <p:par>
+        <p:cTn id="1" dur="indefinite" restart="never" nodeType="tmRoot"/>
+      </p:par>
+    </p:tnLst>
+  </p:timing>
+</p:sld>
+</file>
+
+<file path=ppt/slides/slide16.xml><?xml version="1.0" encoding="utf-8"?>
+<p:sld xmlns:a="http://schemas.openxmlformats.org/drawingml/2006/main" xmlns:r="http://schemas.openxmlformats.org/officeDocument/2006/relationships" xmlns:p="http://schemas.openxmlformats.org/presentationml/2006/main">
+  <p:cSld>
+    <p:spTree>
+      <p:nvGrpSpPr>
+        <p:cNvPr id="1" name=""/>
+        <p:cNvGrpSpPr/>
+        <p:nvPr/>
+      </p:nvGrpSpPr>
+      <p:grpSpPr>
+        <a:xfrm>
+          <a:off x="0" y="0"/>
+          <a:ext cx="0" cy="0"/>
+          <a:chOff x="0" y="0"/>
+          <a:chExt cx="0" cy="0"/>
+        </a:xfrm>
+      </p:grpSpPr>
+      <p:sp>
+        <p:nvSpPr>
+          <p:cNvPr id="4" name="Rectangle 3"/>
+          <p:cNvSpPr/>
+          <p:nvPr/>
+        </p:nvSpPr>
+        <p:spPr>
+          <a:xfrm>
+            <a:off x="39153" y="109410"/>
+            <a:ext cx="720000" cy="540000"/>
+          </a:xfrm>
+          <a:prstGeom prst="rect">
+            <a:avLst/>
+          </a:prstGeom>
+          <a:solidFill>
+            <a:schemeClr val="accent1">
+              <a:lumMod val="40000"/>
+              <a:lumOff val="60000"/>
+            </a:schemeClr>
+          </a:solidFill>
+          <a:ln>
+            <a:solidFill>
+              <a:schemeClr val="accent1">
+                <a:lumMod val="50000"/>
+              </a:schemeClr>
+            </a:solidFill>
+          </a:ln>
+        </p:spPr>
+        <p:style>
+          <a:lnRef idx="2">
+            <a:schemeClr val="accent1">
+              <a:shade val="50000"/>
+            </a:schemeClr>
+          </a:lnRef>
+          <a:fillRef idx="1">
+            <a:schemeClr val="accent1"/>
+          </a:fillRef>
+          <a:effectRef idx="0">
+            <a:schemeClr val="accent1"/>
+          </a:effectRef>
+          <a:fontRef idx="minor">
+            <a:schemeClr val="lt1"/>
+          </a:fontRef>
+        </p:style>
+        <p:txBody>
+          <a:bodyPr wrap="square" lIns="0" rIns="0" rtlCol="0" anchor="ctr"/>
+          <a:lstStyle/>
+          <a:p>
+            <a:pPr algn="ctr"/>
+            <a:r>
+              <a:rPr lang="en-AU" sz="2000" dirty="0">
+                <a:solidFill>
+                  <a:schemeClr val="tx1"/>
+                </a:solidFill>
+              </a:rPr>
+              <a:t>Story </a:t>
+            </a:r>
+            <a:r>
+              <a:rPr lang="en-AU" sz="2000" dirty="0" smtClean="0">
+                <a:solidFill>
+                  <a:schemeClr val="tx1"/>
+                </a:solidFill>
+              </a:rPr>
+              <a:t>15</a:t>
+            </a:r>
+            <a:endParaRPr lang="en-AU" sz="2000" dirty="0">
+              <a:solidFill>
+                <a:schemeClr val="tx1"/>
+              </a:solidFill>
+            </a:endParaRPr>
+          </a:p>
+        </p:txBody>
+      </p:sp>
+      <p:sp>
+        <p:nvSpPr>
+          <p:cNvPr id="5" name="Rectangle 4"/>
+          <p:cNvSpPr/>
+          <p:nvPr/>
+        </p:nvSpPr>
+        <p:spPr>
+          <a:xfrm>
+            <a:off x="831153" y="109410"/>
+            <a:ext cx="7380000" cy="540000"/>
+          </a:xfrm>
+          <a:prstGeom prst="rect">
+            <a:avLst/>
+          </a:prstGeom>
+          <a:ln>
+            <a:solidFill>
+              <a:schemeClr val="accent1">
+                <a:lumMod val="50000"/>
+              </a:schemeClr>
+            </a:solidFill>
+          </a:ln>
+        </p:spPr>
+        <p:style>
+          <a:lnRef idx="2">
+            <a:schemeClr val="accent1">
+              <a:shade val="50000"/>
+            </a:schemeClr>
+          </a:lnRef>
+          <a:fillRef idx="1">
+            <a:schemeClr val="accent1"/>
+          </a:fillRef>
+          <a:effectRef idx="0">
+            <a:schemeClr val="accent1"/>
+          </a:effectRef>
+          <a:fontRef idx="minor">
+            <a:schemeClr val="lt1"/>
+          </a:fontRef>
+        </p:style>
+        <p:txBody>
+          <a:bodyPr rtlCol="0" anchor="ctr"/>
+          <a:lstStyle/>
+          <a:p>
+            <a:pPr algn="ctr"/>
+            <a:r>
+              <a:rPr lang="en-AU" sz="2800" dirty="0"/>
+              <a:t>Viewing </a:t>
+            </a:r>
+            <a:r>
+              <a:rPr lang="en-AU" sz="2800" dirty="0" smtClean="0"/>
+              <a:t>Violations</a:t>
+            </a:r>
+            <a:endParaRPr lang="en-AU" sz="2800" dirty="0"/>
+          </a:p>
+        </p:txBody>
+      </p:sp>
+      <p:sp>
+        <p:nvSpPr>
+          <p:cNvPr id="6" name="Rectangle 5"/>
+          <p:cNvSpPr/>
+          <p:nvPr/>
+        </p:nvSpPr>
+        <p:spPr>
+          <a:xfrm>
+            <a:off x="39153" y="822470"/>
+            <a:ext cx="9828000" cy="2340000"/>
+          </a:xfrm>
+          <a:prstGeom prst="rect">
+            <a:avLst/>
+          </a:prstGeom>
+          <a:solidFill>
+            <a:schemeClr val="tx2">
+              <a:lumMod val="20000"/>
+              <a:lumOff val="80000"/>
+            </a:schemeClr>
+          </a:solidFill>
+          <a:ln>
+            <a:solidFill>
+              <a:schemeClr val="accent1">
+                <a:lumMod val="50000"/>
+              </a:schemeClr>
+            </a:solidFill>
+          </a:ln>
+        </p:spPr>
+        <p:style>
+          <a:lnRef idx="2">
+            <a:schemeClr val="accent1">
+              <a:shade val="50000"/>
+            </a:schemeClr>
+          </a:lnRef>
+          <a:fillRef idx="1">
+            <a:schemeClr val="accent1"/>
+          </a:fillRef>
+          <a:effectRef idx="0">
+            <a:schemeClr val="accent1"/>
+          </a:effectRef>
+          <a:fontRef idx="minor">
+            <a:schemeClr val="lt1"/>
+          </a:fontRef>
+        </p:style>
+        <p:txBody>
+          <a:bodyPr rtlCol="0" anchor="t" anchorCtr="0"/>
+          <a:lstStyle/>
+          <a:p>
+            <a:r>
+              <a:rPr lang="en-AU" sz="2400" dirty="0">
+                <a:solidFill>
+                  <a:schemeClr val="tx1"/>
+                </a:solidFill>
+              </a:rPr>
+              <a:t>As a student/member of the general public I want a way to view </a:t>
+            </a:r>
+            <a:r>
+              <a:rPr lang="en-AU" sz="2400" dirty="0" smtClean="0">
+                <a:solidFill>
+                  <a:schemeClr val="tx1"/>
+                </a:solidFill>
+              </a:rPr>
+              <a:t>the health and safety violations associated with me so I can find out when the fines need to be paid and what keep a record of past violations.</a:t>
+            </a:r>
+            <a:endParaRPr lang="en-AU" sz="2400" dirty="0">
+              <a:solidFill>
+                <a:schemeClr val="tx1"/>
+              </a:solidFill>
+            </a:endParaRPr>
+          </a:p>
+          <a:p>
+            <a:endParaRPr lang="en-AU" sz="2400" dirty="0">
+              <a:solidFill>
+                <a:schemeClr val="tx1"/>
+              </a:solidFill>
+            </a:endParaRPr>
+          </a:p>
+        </p:txBody>
+      </p:sp>
+      <p:sp>
+        <p:nvSpPr>
+          <p:cNvPr id="7" name="Rectangle 6"/>
+          <p:cNvSpPr/>
+          <p:nvPr/>
+        </p:nvSpPr>
+        <p:spPr>
+          <a:xfrm>
+            <a:off x="39153" y="3335530"/>
+            <a:ext cx="9828000" cy="1620000"/>
+          </a:xfrm>
+          <a:prstGeom prst="rect">
+            <a:avLst/>
+          </a:prstGeom>
+          <a:solidFill>
+            <a:schemeClr val="accent1">
+              <a:lumMod val="20000"/>
+              <a:lumOff val="80000"/>
+            </a:schemeClr>
+          </a:solidFill>
+          <a:ln>
+            <a:solidFill>
+              <a:schemeClr val="accent1">
+                <a:lumMod val="50000"/>
+              </a:schemeClr>
+            </a:solidFill>
+          </a:ln>
+        </p:spPr>
+        <p:style>
+          <a:lnRef idx="2">
+            <a:schemeClr val="accent1">
+              <a:shade val="50000"/>
+            </a:schemeClr>
+          </a:lnRef>
+          <a:fillRef idx="1">
+            <a:schemeClr val="accent1"/>
+          </a:fillRef>
+          <a:effectRef idx="0">
+            <a:schemeClr val="accent1"/>
+          </a:effectRef>
+          <a:fontRef idx="minor">
+            <a:schemeClr val="lt1"/>
+          </a:fontRef>
+        </p:style>
+        <p:txBody>
+          <a:bodyPr tIns="36000" rtlCol="0" anchor="t" anchorCtr="0"/>
+          <a:lstStyle/>
+          <a:p>
+            <a:r>
+              <a:rPr lang="en-AU" sz="2000" dirty="0">
+                <a:solidFill>
+                  <a:schemeClr val="tx1"/>
+                </a:solidFill>
+              </a:rPr>
+              <a:t>Acceptance Criteria</a:t>
+            </a:r>
+          </a:p>
+          <a:p>
+            <a:pPr marL="179388" indent="-179388">
+              <a:buFont typeface="Arial" pitchFamily="34" charset="0"/>
+              <a:buChar char="•"/>
+            </a:pPr>
+            <a:r>
+              <a:rPr lang="en-AU" sz="2000" dirty="0">
+                <a:solidFill>
+                  <a:schemeClr val="tx1"/>
+                </a:solidFill>
+              </a:rPr>
+              <a:t> A new page to display </a:t>
+            </a:r>
+            <a:r>
+              <a:rPr lang="en-AU" sz="2000" dirty="0" smtClean="0">
+                <a:solidFill>
+                  <a:schemeClr val="tx1"/>
+                </a:solidFill>
+              </a:rPr>
+              <a:t>health and safety violation information including date, description and payed status/time till late fee’s apply. </a:t>
+            </a:r>
+            <a:endParaRPr lang="en-AU" sz="2000" dirty="0">
+              <a:solidFill>
+                <a:schemeClr val="tx1"/>
+              </a:solidFill>
+            </a:endParaRPr>
+          </a:p>
+          <a:p>
+            <a:pPr marL="179388" indent="-179388">
+              <a:buFont typeface="Arial" pitchFamily="34" charset="0"/>
+              <a:buChar char="•"/>
+            </a:pPr>
+            <a:r>
+              <a:rPr lang="en-AU" sz="2000" dirty="0">
+                <a:solidFill>
+                  <a:schemeClr val="tx1"/>
+                </a:solidFill>
+              </a:rPr>
+              <a:t>Only the </a:t>
+            </a:r>
+            <a:r>
+              <a:rPr lang="en-AU" sz="2000" dirty="0" smtClean="0">
+                <a:solidFill>
+                  <a:schemeClr val="tx1"/>
+                </a:solidFill>
+              </a:rPr>
+              <a:t>violations for the active user are </a:t>
+            </a:r>
+            <a:r>
+              <a:rPr lang="en-AU" sz="2000" dirty="0">
+                <a:solidFill>
+                  <a:schemeClr val="tx1"/>
+                </a:solidFill>
+              </a:rPr>
+              <a:t>displayed.</a:t>
+            </a:r>
+          </a:p>
+        </p:txBody>
+      </p:sp>
+      <p:sp>
+        <p:nvSpPr>
+          <p:cNvPr id="8" name="Rectangle 7"/>
+          <p:cNvSpPr/>
+          <p:nvPr/>
+        </p:nvSpPr>
+        <p:spPr>
+          <a:xfrm>
+            <a:off x="9147153" y="109410"/>
+            <a:ext cx="720000" cy="540000"/>
+          </a:xfrm>
+          <a:prstGeom prst="rect">
+            <a:avLst/>
+          </a:prstGeom>
+          <a:solidFill>
+            <a:srgbClr val="CCF0CD">
+              <a:alpha val="20000"/>
+            </a:srgbClr>
+          </a:solidFill>
+          <a:ln>
+            <a:solidFill>
+              <a:schemeClr val="accent1">
+                <a:lumMod val="50000"/>
+              </a:schemeClr>
+            </a:solidFill>
+          </a:ln>
+        </p:spPr>
+        <p:style>
+          <a:lnRef idx="2">
+            <a:schemeClr val="accent1">
+              <a:shade val="50000"/>
+            </a:schemeClr>
+          </a:lnRef>
+          <a:fillRef idx="1">
+            <a:schemeClr val="accent1"/>
+          </a:fillRef>
+          <a:effectRef idx="0">
+            <a:schemeClr val="accent1"/>
+          </a:effectRef>
+          <a:fontRef idx="minor">
+            <a:schemeClr val="lt1"/>
+          </a:fontRef>
+        </p:style>
+        <p:txBody>
+          <a:bodyPr wrap="square" lIns="0" rIns="0" rtlCol="0" anchor="ctr"/>
+          <a:lstStyle/>
+          <a:p>
+            <a:pPr algn="ctr"/>
+            <a:r>
+              <a:rPr lang="en-AU" sz="2000" dirty="0" smtClean="0">
+                <a:solidFill>
+                  <a:schemeClr val="tx1"/>
+                </a:solidFill>
+              </a:rPr>
+              <a:t>SP</a:t>
+            </a:r>
+          </a:p>
+          <a:p>
+            <a:pPr algn="ctr"/>
+            <a:r>
+              <a:rPr lang="en-AU" sz="2000" dirty="0">
+                <a:solidFill>
+                  <a:schemeClr val="tx1"/>
+                </a:solidFill>
+              </a:rPr>
+              <a:t>8</a:t>
+            </a:r>
+            <a:endParaRPr lang="en-AU" sz="2000" dirty="0">
+              <a:solidFill>
+                <a:schemeClr val="tx1"/>
+              </a:solidFill>
+            </a:endParaRPr>
+          </a:p>
+        </p:txBody>
+      </p:sp>
+      <p:sp>
+        <p:nvSpPr>
+          <p:cNvPr id="9" name="Rectangle 8"/>
+          <p:cNvSpPr/>
+          <p:nvPr/>
+        </p:nvSpPr>
+        <p:spPr>
+          <a:xfrm>
+            <a:off x="8283153" y="109410"/>
+            <a:ext cx="792000" cy="540000"/>
+          </a:xfrm>
+          <a:prstGeom prst="rect">
+            <a:avLst/>
+          </a:prstGeom>
+          <a:solidFill>
+            <a:schemeClr val="accent4">
+              <a:lumMod val="20000"/>
+              <a:lumOff val="80000"/>
+            </a:schemeClr>
+          </a:solidFill>
+          <a:ln>
+            <a:solidFill>
+              <a:schemeClr val="accent1">
+                <a:lumMod val="50000"/>
+              </a:schemeClr>
+            </a:solidFill>
+          </a:ln>
+        </p:spPr>
+        <p:style>
+          <a:lnRef idx="2">
+            <a:schemeClr val="accent1">
+              <a:shade val="50000"/>
+            </a:schemeClr>
+          </a:lnRef>
+          <a:fillRef idx="1">
+            <a:schemeClr val="accent1"/>
+          </a:fillRef>
+          <a:effectRef idx="0">
+            <a:schemeClr val="accent1"/>
+          </a:effectRef>
+          <a:fontRef idx="minor">
+            <a:schemeClr val="lt1"/>
+          </a:fontRef>
+        </p:style>
+        <p:txBody>
+          <a:bodyPr wrap="none" lIns="0" rIns="0" rtlCol="0" anchor="ctr"/>
+          <a:lstStyle/>
+          <a:p>
+            <a:pPr algn="ctr"/>
+            <a:r>
+              <a:rPr lang="en-AU" sz="2000" dirty="0">
+                <a:solidFill>
+                  <a:schemeClr val="tx1"/>
+                </a:solidFill>
+              </a:rPr>
+              <a:t>S</a:t>
+            </a:r>
+          </a:p>
+        </p:txBody>
+      </p:sp>
+      <p:sp>
+        <p:nvSpPr>
+          <p:cNvPr id="10" name="Rectangle 9"/>
+          <p:cNvSpPr/>
+          <p:nvPr/>
+        </p:nvSpPr>
+        <p:spPr>
+          <a:xfrm>
+            <a:off x="39153" y="5128590"/>
+            <a:ext cx="9828000" cy="1620000"/>
+          </a:xfrm>
+          <a:prstGeom prst="rect">
+            <a:avLst/>
+          </a:prstGeom>
+          <a:solidFill>
+            <a:schemeClr val="bg1"/>
+          </a:solidFill>
+          <a:ln>
+            <a:solidFill>
+              <a:schemeClr val="accent1">
+                <a:lumMod val="50000"/>
+              </a:schemeClr>
+            </a:solidFill>
+          </a:ln>
+        </p:spPr>
+        <p:style>
+          <a:lnRef idx="2">
+            <a:schemeClr val="accent1">
+              <a:shade val="50000"/>
+            </a:schemeClr>
+          </a:lnRef>
+          <a:fillRef idx="1">
+            <a:schemeClr val="accent1"/>
+          </a:fillRef>
+          <a:effectRef idx="0">
+            <a:schemeClr val="accent1"/>
+          </a:effectRef>
+          <a:fontRef idx="minor">
+            <a:schemeClr val="lt1"/>
+          </a:fontRef>
+        </p:style>
+        <p:txBody>
+          <a:bodyPr tIns="36000" rtlCol="0" anchor="t" anchorCtr="0"/>
+          <a:lstStyle/>
+          <a:p>
+            <a:r>
+              <a:rPr lang="en-AU" sz="2000" dirty="0">
+                <a:solidFill>
+                  <a:schemeClr val="tx1"/>
+                </a:solidFill>
+              </a:rPr>
+              <a:t>Notes</a:t>
+            </a:r>
+          </a:p>
+          <a:p>
+            <a:pPr marL="179388" indent="-179388">
+              <a:buFont typeface="Arial" pitchFamily="34" charset="0"/>
+              <a:buChar char="•"/>
+            </a:pPr>
+            <a:r>
+              <a:rPr lang="en-AU" sz="2000" dirty="0">
+                <a:solidFill>
+                  <a:schemeClr val="tx1"/>
+                </a:solidFill>
+              </a:rPr>
+              <a:t>May require using the info given for parking permit registration to access the information.</a:t>
+            </a:r>
+            <a:endParaRPr lang="en-AU" sz="2000" dirty="0">
+              <a:solidFill>
+                <a:srgbClr val="FF0000"/>
+              </a:solidFill>
+            </a:endParaRPr>
+          </a:p>
+        </p:txBody>
+      </p:sp>
+    </p:spTree>
+    <p:extLst>
+      <p:ext uri="{BB962C8B-B14F-4D97-AF65-F5344CB8AC3E}">
+        <p14:creationId xmlns:p14="http://schemas.microsoft.com/office/powerpoint/2010/main" val="3500701850"/>
       </p:ext>
     </p:extLst>
   </p:cSld>
@@ -6429,8 +7634,13 @@
                   <a:schemeClr val="tx1"/>
                 </a:solidFill>
               </a:rPr>
-              <a:t>4</a:t>
-            </a:r>
+              <a:t>8</a:t>
+            </a:r>
+            <a:endParaRPr lang="en-AU" sz="2000" dirty="0">
+              <a:solidFill>
+                <a:schemeClr val="tx1"/>
+              </a:solidFill>
+            </a:endParaRPr>
           </a:p>
         </p:txBody>
       </p:sp>
@@ -7982,7 +9192,7 @@
                   <a:schemeClr val="tx1"/>
                 </a:solidFill>
               </a:rPr>
-              <a:t>32</a:t>
+              <a:t>16</a:t>
             </a:r>
             <a:endParaRPr lang="en-AU" sz="2000" dirty="0">
               <a:solidFill>
@@ -9296,9 +10506,10 @@
           <a:p>
             <a:pPr algn="ctr"/>
             <a:r>
-              <a:rPr lang="en-AU" sz="2800" dirty="0"/>
-              <a:t>Public Health and Safety</a:t>
-            </a:r>
+              <a:rPr lang="en-AU" sz="2800" dirty="0" smtClean="0"/>
+              <a:t>Violation report anonymity</a:t>
+            </a:r>
+            <a:endParaRPr lang="en-AU" sz="2800" dirty="0"/>
           </a:p>
         </p:txBody>
       </p:sp>
@@ -9776,8 +10987,13 @@
             <a:pPr algn="ctr"/>
             <a:r>
               <a:rPr lang="en-AU" sz="2800" dirty="0"/>
-              <a:t>Viewing Parking/Health Violations</a:t>
-            </a:r>
+              <a:t>Viewing </a:t>
+            </a:r>
+            <a:r>
+              <a:rPr lang="en-AU" sz="2800" dirty="0" smtClean="0"/>
+              <a:t>Parking Permits</a:t>
+            </a:r>
+            <a:endParaRPr lang="en-AU" sz="2800" dirty="0"/>
           </a:p>
         </p:txBody>
       </p:sp>
@@ -9835,16 +11051,29 @@
                   <a:schemeClr val="tx1"/>
                 </a:solidFill>
               </a:rPr>
-              <a:t>As a student/member of the general public I want a way to view my parking permits or health violations.</a:t>
-            </a:r>
-          </a:p>
-          <a:p>
+              <a:t>As a student/member of the general public I want a way to view my parking permits </a:t>
+            </a:r>
+            <a:r>
+              <a:rPr lang="en-AU" sz="2400" dirty="0" smtClean="0">
+                <a:solidFill>
+                  <a:schemeClr val="tx1"/>
+                </a:solidFill>
+              </a:rPr>
+              <a:t>so I can know what permits I have and when they expire.</a:t>
+            </a:r>
             <a:endParaRPr lang="en-AU" sz="2400" dirty="0">
               <a:solidFill>
                 <a:schemeClr val="tx1"/>
               </a:solidFill>
             </a:endParaRPr>
           </a:p>
+          <a:p>
+            <a:endParaRPr lang="en-AU" sz="2400" dirty="0">
+              <a:solidFill>
+                <a:schemeClr val="tx1"/>
+              </a:solidFill>
+            </a:endParaRPr>
+          </a:p>
         </p:txBody>
       </p:sp>
       <p:sp>
@@ -9915,8 +11144,21 @@
                   <a:schemeClr val="tx1"/>
                 </a:solidFill>
               </a:rPr>
-              <a:t> A new page to display permits (including X) and health violations (including Y).</a:t>
-            </a:r>
+              <a:t> A new page to display </a:t>
+            </a:r>
+            <a:r>
+              <a:rPr lang="en-AU" sz="2000" dirty="0" smtClean="0">
+                <a:solidFill>
+                  <a:schemeClr val="tx1"/>
+                </a:solidFill>
+              </a:rPr>
+              <a:t>parking permit information including date approved and expiry date. </a:t>
+            </a:r>
+            <a:endParaRPr lang="en-AU" sz="2000" dirty="0">
+              <a:solidFill>
+                <a:schemeClr val="tx1"/>
+              </a:solidFill>
+            </a:endParaRPr>
           </a:p>
           <a:p>
             <a:pPr marL="179388" indent="-179388">
@@ -9929,7 +11171,23 @@
                   <a:schemeClr val="tx1"/>
                 </a:solidFill>
               </a:rPr>
-              <a:t>Only the users permits/violations are displayed.</a:t>
+              <a:t>Only the </a:t>
+            </a:r>
+            <a:r>
+              <a:rPr lang="en-AU" sz="2000" dirty="0" smtClean="0">
+                <a:solidFill>
+                  <a:schemeClr val="tx1"/>
+                </a:solidFill>
+              </a:rPr>
+              <a:t>permits for the active user are </a:t>
+            </a:r>
+            <a:r>
+              <a:rPr lang="en-AU" sz="2000" dirty="0">
+                <a:solidFill>
+                  <a:schemeClr val="tx1"/>
+                </a:solidFill>
+              </a:rPr>
+              <a:t>displayed.</a:t>
             </a:r>
           </a:p>
         </p:txBody>
@@ -9994,12 +11252,12 @@
           <a:p>
             <a:pPr algn="ctr"/>
             <a:r>
-              <a:rPr lang="en-AU" sz="2000" dirty="0" smtClean="0">
-                <a:solidFill>
-                  <a:schemeClr val="tx1"/>
-                </a:solidFill>
-              </a:rPr>
-              <a:t>16</a:t>
+              <a:rPr lang="en-AU" sz="2000" dirty="0">
+                <a:solidFill>
+                  <a:schemeClr val="tx1"/>
+                </a:solidFill>
+              </a:rPr>
+              <a:t>8</a:t>
             </a:r>
             <a:endParaRPr lang="en-AU" sz="2000" dirty="0">
               <a:solidFill>

</xml_diff>

<commit_message>
Added more changes to release plans
</commit_message>
<xml_diff>
--- a/Assessment/Story Cards.pptx
+++ b/Assessment/Story Cards.pptx
@@ -5227,11 +5227,7 @@
             <a:pPr algn="ctr"/>
             <a:r>
               <a:rPr lang="en-AU" sz="2800" dirty="0" smtClean="0"/>
-              <a:t>Secure and available </a:t>
-            </a:r>
-            <a:r>
-              <a:rPr lang="en-AU" sz="2800" dirty="0" smtClean="0"/>
-              <a:t>permits </a:t>
+              <a:t>Secure and available permits </a:t>
             </a:r>
             <a:endParaRPr lang="en-AU" sz="2800" dirty="0"/>
           </a:p>
@@ -5299,23 +5295,7 @@
                   <a:schemeClr val="tx1"/>
                 </a:solidFill>
               </a:rPr>
-              <a:t>staff member, </a:t>
-            </a:r>
-            <a:r>
-              <a:rPr lang="en-AU" sz="2400" dirty="0" smtClean="0">
-                <a:solidFill>
-                  <a:schemeClr val="tx1"/>
-                </a:solidFill>
-              </a:rPr>
-              <a:t>student or visitor I want my permit stored securely so my permit cannot be stolen or lost</a:t>
-            </a:r>
-            <a:r>
-              <a:rPr lang="en-AU" sz="2400" dirty="0" smtClean="0">
-                <a:solidFill>
-                  <a:schemeClr val="tx1"/>
-                </a:solidFill>
-              </a:rPr>
-              <a:t>.</a:t>
+              <a:t>staff member, student or visitor I want my permit stored securely so my permit cannot be stolen or lost.</a:t>
             </a:r>
             <a:endParaRPr lang="en-AU" sz="2400" dirty="0">
               <a:solidFill>
@@ -5776,11 +5756,7 @@
             <a:pPr algn="ctr"/>
             <a:r>
               <a:rPr lang="en-AU" sz="2800" dirty="0" smtClean="0"/>
-              <a:t>Accessible and secure </a:t>
-            </a:r>
-            <a:r>
-              <a:rPr lang="en-AU" sz="2800" dirty="0" smtClean="0"/>
-              <a:t>health violations</a:t>
+              <a:t>Accessible and secure health violations</a:t>
             </a:r>
             <a:endParaRPr lang="en-AU" sz="2800" dirty="0"/>
           </a:p>
@@ -5848,31 +5824,7 @@
                   <a:schemeClr val="tx1"/>
                 </a:solidFill>
               </a:rPr>
-              <a:t>a member of </a:t>
-            </a:r>
-            <a:r>
-              <a:rPr lang="en-AU" sz="2400" dirty="0" smtClean="0">
-                <a:solidFill>
-                  <a:schemeClr val="tx1"/>
-                </a:solidFill>
-              </a:rPr>
-              <a:t>a departments staff, </a:t>
-            </a:r>
-            <a:r>
-              <a:rPr lang="en-AU" sz="2400" dirty="0" smtClean="0">
-                <a:solidFill>
-                  <a:schemeClr val="tx1"/>
-                </a:solidFill>
-              </a:rPr>
-              <a:t>I want health violation reports to be stored securel</a:t>
-            </a:r>
-            <a:r>
-              <a:rPr lang="en-AU" sz="2400" dirty="0" smtClean="0">
-                <a:solidFill>
-                  <a:schemeClr val="tx1"/>
-                </a:solidFill>
-              </a:rPr>
-              <a:t>y so that the reports will not be lost either accidently or from outside attacks.</a:t>
+              <a:t>a member of a departments staff, I want health violation reports to be stored securely so that the reports will not be lost either accidently or from outside attacks.</a:t>
             </a:r>
             <a:endParaRPr lang="en-AU" sz="2400" dirty="0">
               <a:solidFill>
@@ -6386,15 +6338,7 @@
                   <a:schemeClr val="tx1"/>
                 </a:solidFill>
               </a:rPr>
-              <a:t>a staff member, student or visitor, I want the parking permit and health violation webpage to be fast and responsive so I can submit the forms as quickly as possible</a:t>
-            </a:r>
-            <a:r>
-              <a:rPr lang="en-AU" sz="2400" dirty="0" smtClean="0">
-                <a:solidFill>
-                  <a:schemeClr val="tx1"/>
-                </a:solidFill>
-              </a:rPr>
-              <a:t>.</a:t>
+              <a:t>a staff member, student or visitor, I want the parking permit and health violation webpage to be fast and responsive so I can submit the forms as quickly as possible.</a:t>
             </a:r>
             <a:endParaRPr lang="en-AU" sz="2400" dirty="0">
               <a:solidFill>
@@ -6563,11 +6507,6 @@
               </a:rPr>
               <a:t>4</a:t>
             </a:r>
-            <a:endParaRPr lang="en-AU" sz="2000" dirty="0">
-              <a:solidFill>
-                <a:schemeClr val="tx1"/>
-              </a:solidFill>
-            </a:endParaRPr>
           </a:p>
         </p:txBody>
       </p:sp>
@@ -7126,11 +7065,6 @@
               </a:rPr>
               <a:t>8</a:t>
             </a:r>
-            <a:endParaRPr lang="en-AU" sz="2000" dirty="0">
-              <a:solidFill>
-                <a:schemeClr val="tx1"/>
-              </a:solidFill>
-            </a:endParaRPr>
           </a:p>
         </p:txBody>
       </p:sp>
@@ -7636,11 +7570,6 @@
               </a:rPr>
               <a:t>8</a:t>
             </a:r>
-            <a:endParaRPr lang="en-AU" sz="2000" dirty="0">
-              <a:solidFill>
-                <a:schemeClr val="tx1"/>
-              </a:solidFill>
-            </a:endParaRPr>
           </a:p>
         </p:txBody>
       </p:sp>
@@ -9856,33 +9785,27 @@
                   <a:schemeClr val="tx1"/>
                 </a:solidFill>
               </a:rPr>
-              <a:t>Mobile devices (phones or tablets) may need to be supplied by the department in this case</a:t>
-            </a:r>
-            <a:r>
-              <a:rPr lang="en-AU" sz="2000" dirty="0" smtClean="0">
+              <a:t>Mobile devices (phones or tablets) may need to be supplied by the department in this </a:t>
+            </a:r>
+            <a:r>
+              <a:rPr lang="en-AU" sz="2000">
+                <a:solidFill>
+                  <a:schemeClr val="tx1"/>
+                </a:solidFill>
+              </a:rPr>
+              <a:t>case</a:t>
+            </a:r>
+            <a:r>
+              <a:rPr lang="en-AU" sz="2000" smtClean="0">
                 <a:solidFill>
                   <a:schemeClr val="tx1"/>
                 </a:solidFill>
               </a:rPr>
               <a:t>.</a:t>
             </a:r>
-          </a:p>
-          <a:p>
-            <a:pPr marL="179388" indent="-179388">
-              <a:buFont typeface="Arial" pitchFamily="34" charset="0"/>
-              <a:buChar char="•"/>
-            </a:pPr>
-            <a:r>
-              <a:rPr lang="en-AU" sz="2000" dirty="0" smtClean="0">
-                <a:solidFill>
-                  <a:srgbClr val="FF0000"/>
-                </a:solidFill>
-              </a:rPr>
-              <a:t>Mobile only?</a:t>
-            </a:r>
-            <a:endParaRPr lang="en-AU" sz="2000" dirty="0">
+            <a:endParaRPr lang="en-AU" sz="2000" dirty="0" smtClean="0">
               <a:solidFill>
-                <a:srgbClr val="FF0000"/>
+                <a:schemeClr val="tx1"/>
               </a:solidFill>
             </a:endParaRPr>
           </a:p>
@@ -11259,11 +11182,6 @@
               </a:rPr>
               <a:t>8</a:t>
             </a:r>
-            <a:endParaRPr lang="en-AU" sz="2000" dirty="0">
-              <a:solidFill>
-                <a:schemeClr val="tx1"/>
-              </a:solidFill>
-            </a:endParaRPr>
           </a:p>
         </p:txBody>
       </p:sp>

</xml_diff>